<commit_message>
3 spaltiges layout alternative
</commit_message>
<xml_diff>
--- a/EnPro_ALF_Poster_2.pptx
+++ b/EnPro_ALF_Poster_2.pptx
@@ -6078,7 +6078,7 @@
         <p:spPr>
           <a:xfrm>
             <a:off x="16372114" y="32165272"/>
-            <a:ext cx="11277600" cy="4062386"/>
+            <a:ext cx="11277600" cy="3915428"/>
           </a:xfrm>
           <a:prstGeom prst="rect">
             <a:avLst/>
@@ -7980,6 +7980,42 @@
           <a:xfrm>
             <a:off x="16092742" y="14379939"/>
             <a:ext cx="11734800" cy="3171825"/>
+          </a:xfrm>
+          <a:prstGeom prst="rect">
+            <a:avLst/>
+          </a:prstGeom>
+        </p:spPr>
+      </p:pic>
+      <p:pic>
+        <p:nvPicPr>
+          <p:cNvPr id="34" name="Grafik 33" descr="Ein Bild, das Text, Karte enthält.&#10;&#10;Automatisch generierte Beschreibung">
+            <a:extLst>
+              <a:ext uri="{FF2B5EF4-FFF2-40B4-BE49-F238E27FC236}">
+                <a16:creationId xmlns:a16="http://schemas.microsoft.com/office/drawing/2014/main" id="{C38CA9F5-936F-4047-8FB9-8C78DB8627CC}"/>
+              </a:ext>
+            </a:extLst>
+          </p:cNvPr>
+          <p:cNvPicPr>
+            <a:picLocks noChangeAspect="1"/>
+          </p:cNvPicPr>
+          <p:nvPr/>
+        </p:nvPicPr>
+        <p:blipFill>
+          <a:blip r:embed="rId8">
+            <a:extLst>
+              <a:ext uri="{28A0092B-C50C-407E-A947-70E740481C1C}">
+                <a14:useLocalDpi xmlns:a14="http://schemas.microsoft.com/office/drawing/2010/main" val="0"/>
+              </a:ext>
+            </a:extLst>
+          </a:blip>
+          <a:stretch>
+            <a:fillRect/>
+          </a:stretch>
+        </p:blipFill>
+        <p:spPr>
+          <a:xfrm>
+            <a:off x="17013017" y="32470535"/>
+            <a:ext cx="4620270" cy="3419952"/>
           </a:xfrm>
           <a:prstGeom prst="rect">
             <a:avLst/>

</xml_diff>

<commit_message>
Added label text and other things
</commit_message>
<xml_diff>
--- a/EnPro_ALF_Poster_2.pptx
+++ b/EnPro_ALF_Poster_2.pptx
@@ -1,19 +1,119 @@
 
 <file path=ppt/presentation.xml><?xml version="1.0" encoding="utf-8"?>
-<p:presentation xmlns:a="http://schemas.openxmlformats.org/drawingml/2006/main" xmlns:p="http://schemas.openxmlformats.org/presentationml/2006/main" xmlns:r="http://schemas.openxmlformats.org/officeDocument/2006/relationships" xmlns:p14="http://schemas.microsoft.com/office/powerpoint/2010/main" xmlns:p15="http://schemas.microsoft.com/office/powerpoint/2012/main" xmlns:mc="http://schemas.openxmlformats.org/markup-compatibility/2006">
+<p:presentation xmlns:a="http://schemas.openxmlformats.org/drawingml/2006/main" xmlns:r="http://schemas.openxmlformats.org/officeDocument/2006/relationships" xmlns:p="http://schemas.openxmlformats.org/presentationml/2006/main">
   <p:sldMasterIdLst>
-    <p:sldMasterId id="2147483648" r:id="rId2"/>
+    <p:sldMasterId id="2147483648" r:id="rId1"/>
   </p:sldMasterIdLst>
   <p:sldIdLst>
-    <p:sldId id="256" r:id="rId3"/>
+    <p:sldId id="256" r:id="rId2"/>
   </p:sldIdLst>
   <p:sldSz cx="30279975" cy="42808525"/>
-  <p:notesSz cx="7559675" cy="10691812"/>
+  <p:notesSz cx="7559675" cy="10691813"/>
+  <p:defaultTextStyle>
+    <a:defPPr>
+      <a:defRPr lang="de-DE"/>
+    </a:defPPr>
+    <a:lvl1pPr marL="0" algn="l" defTabSz="914400" rtl="0" eaLnBrk="1" latinLnBrk="0" hangingPunct="1">
+      <a:defRPr sz="1800" kern="1200">
+        <a:solidFill>
+          <a:schemeClr val="tx1"/>
+        </a:solidFill>
+        <a:latin typeface="+mn-lt"/>
+        <a:ea typeface="+mn-ea"/>
+        <a:cs typeface="+mn-cs"/>
+      </a:defRPr>
+    </a:lvl1pPr>
+    <a:lvl2pPr marL="457200" algn="l" defTabSz="914400" rtl="0" eaLnBrk="1" latinLnBrk="0" hangingPunct="1">
+      <a:defRPr sz="1800" kern="1200">
+        <a:solidFill>
+          <a:schemeClr val="tx1"/>
+        </a:solidFill>
+        <a:latin typeface="+mn-lt"/>
+        <a:ea typeface="+mn-ea"/>
+        <a:cs typeface="+mn-cs"/>
+      </a:defRPr>
+    </a:lvl2pPr>
+    <a:lvl3pPr marL="914400" algn="l" defTabSz="914400" rtl="0" eaLnBrk="1" latinLnBrk="0" hangingPunct="1">
+      <a:defRPr sz="1800" kern="1200">
+        <a:solidFill>
+          <a:schemeClr val="tx1"/>
+        </a:solidFill>
+        <a:latin typeface="+mn-lt"/>
+        <a:ea typeface="+mn-ea"/>
+        <a:cs typeface="+mn-cs"/>
+      </a:defRPr>
+    </a:lvl3pPr>
+    <a:lvl4pPr marL="1371600" algn="l" defTabSz="914400" rtl="0" eaLnBrk="1" latinLnBrk="0" hangingPunct="1">
+      <a:defRPr sz="1800" kern="1200">
+        <a:solidFill>
+          <a:schemeClr val="tx1"/>
+        </a:solidFill>
+        <a:latin typeface="+mn-lt"/>
+        <a:ea typeface="+mn-ea"/>
+        <a:cs typeface="+mn-cs"/>
+      </a:defRPr>
+    </a:lvl4pPr>
+    <a:lvl5pPr marL="1828800" algn="l" defTabSz="914400" rtl="0" eaLnBrk="1" latinLnBrk="0" hangingPunct="1">
+      <a:defRPr sz="1800" kern="1200">
+        <a:solidFill>
+          <a:schemeClr val="tx1"/>
+        </a:solidFill>
+        <a:latin typeface="+mn-lt"/>
+        <a:ea typeface="+mn-ea"/>
+        <a:cs typeface="+mn-cs"/>
+      </a:defRPr>
+    </a:lvl5pPr>
+    <a:lvl6pPr marL="2286000" algn="l" defTabSz="914400" rtl="0" eaLnBrk="1" latinLnBrk="0" hangingPunct="1">
+      <a:defRPr sz="1800" kern="1200">
+        <a:solidFill>
+          <a:schemeClr val="tx1"/>
+        </a:solidFill>
+        <a:latin typeface="+mn-lt"/>
+        <a:ea typeface="+mn-ea"/>
+        <a:cs typeface="+mn-cs"/>
+      </a:defRPr>
+    </a:lvl6pPr>
+    <a:lvl7pPr marL="2743200" algn="l" defTabSz="914400" rtl="0" eaLnBrk="1" latinLnBrk="0" hangingPunct="1">
+      <a:defRPr sz="1800" kern="1200">
+        <a:solidFill>
+          <a:schemeClr val="tx1"/>
+        </a:solidFill>
+        <a:latin typeface="+mn-lt"/>
+        <a:ea typeface="+mn-ea"/>
+        <a:cs typeface="+mn-cs"/>
+      </a:defRPr>
+    </a:lvl7pPr>
+    <a:lvl8pPr marL="3200400" algn="l" defTabSz="914400" rtl="0" eaLnBrk="1" latinLnBrk="0" hangingPunct="1">
+      <a:defRPr sz="1800" kern="1200">
+        <a:solidFill>
+          <a:schemeClr val="tx1"/>
+        </a:solidFill>
+        <a:latin typeface="+mn-lt"/>
+        <a:ea typeface="+mn-ea"/>
+        <a:cs typeface="+mn-cs"/>
+      </a:defRPr>
+    </a:lvl8pPr>
+    <a:lvl9pPr marL="3657600" algn="l" defTabSz="914400" rtl="0" eaLnBrk="1" latinLnBrk="0" hangingPunct="1">
+      <a:defRPr sz="1800" kern="1200">
+        <a:solidFill>
+          <a:schemeClr val="tx1"/>
+        </a:solidFill>
+        <a:latin typeface="+mn-lt"/>
+        <a:ea typeface="+mn-ea"/>
+        <a:cs typeface="+mn-cs"/>
+      </a:defRPr>
+    </a:lvl9pPr>
+  </p:defaultTextStyle>
+  <p:extLst>
+    <p:ext uri="{EFAFB233-063F-42B5-8137-9DF3F51BA10A}">
+      <p15:sldGuideLst xmlns:p15="http://schemas.microsoft.com/office/powerpoint/2012/main"/>
+    </p:ext>
+  </p:extLst>
 </p:presentation>
 </file>
 
 <file path=ppt/slideLayouts/slideLayout1.xml><?xml version="1.0" encoding="utf-8"?>
-<p:sldLayout xmlns:a="http://schemas.openxmlformats.org/drawingml/2006/main" xmlns:p="http://schemas.openxmlformats.org/presentationml/2006/main" xmlns:r="http://schemas.openxmlformats.org/officeDocument/2006/relationships" xmlns:p14="http://schemas.microsoft.com/office/powerpoint/2010/main" xmlns:p15="http://schemas.microsoft.com/office/powerpoint/2012/main" xmlns:mc="http://schemas.openxmlformats.org/markup-compatibility/2006" type="blank" preserve="1">
+<p:sldLayout xmlns:a="http://schemas.openxmlformats.org/drawingml/2006/main" xmlns:r="http://schemas.openxmlformats.org/officeDocument/2006/relationships" xmlns:p="http://schemas.openxmlformats.org/presentationml/2006/main" type="blank" preserve="1">
   <p:cSld name="Blank Slide">
     <p:spTree>
       <p:nvGrpSpPr>
@@ -31,11 +131,14 @@
       </p:grpSpPr>
     </p:spTree>
   </p:cSld>
+  <p:clrMapOvr>
+    <a:masterClrMapping/>
+  </p:clrMapOvr>
 </p:sldLayout>
 </file>
 
 <file path=ppt/slideLayouts/slideLayout10.xml><?xml version="1.0" encoding="utf-8"?>
-<p:sldLayout xmlns:a="http://schemas.openxmlformats.org/drawingml/2006/main" xmlns:p="http://schemas.openxmlformats.org/presentationml/2006/main" xmlns:r="http://schemas.openxmlformats.org/officeDocument/2006/relationships" xmlns:p14="http://schemas.microsoft.com/office/powerpoint/2010/main" xmlns:p15="http://schemas.microsoft.com/office/powerpoint/2012/main" xmlns:mc="http://schemas.openxmlformats.org/markup-compatibility/2006" type="objOverTx" preserve="1">
+<p:sldLayout xmlns:a="http://schemas.openxmlformats.org/drawingml/2006/main" xmlns:r="http://schemas.openxmlformats.org/officeDocument/2006/relationships" xmlns:p="http://schemas.openxmlformats.org/presentationml/2006/main" type="objOverTx" preserve="1">
   <p:cSld name="Title, Content over Content">
     <p:spTree>
       <p:nvGrpSpPr>
@@ -71,11 +174,12 @@
           </a:prstGeom>
         </p:spPr>
         <p:txBody>
-          <a:bodyPr lIns="0" rIns="0" tIns="0" bIns="0" anchor="ctr">
+          <a:bodyPr lIns="0" tIns="0" rIns="0" bIns="0" anchor="ctr">
             <a:spAutoFit/>
           </a:bodyPr>
-          <a:p>
-            <a:endParaRPr b="0" lang="de-DE" sz="1800" spc="-1" strike="noStrike">
+          <a:lstStyle/>
+          <a:p>
+            <a:endParaRPr lang="de-DE" sz="1800" b="0" strike="noStrike" spc="-1">
               <a:solidFill>
                 <a:srgbClr val="000000"/>
               </a:solidFill>
@@ -104,11 +208,12 @@
           </a:prstGeom>
         </p:spPr>
         <p:txBody>
-          <a:bodyPr lIns="0" rIns="0" tIns="0" bIns="0">
+          <a:bodyPr lIns="0" tIns="0" rIns="0" bIns="0">
             <a:normAutofit/>
           </a:bodyPr>
-          <a:p>
-            <a:endParaRPr b="0" lang="de-DE" sz="2800" spc="-1" strike="noStrike">
+          <a:lstStyle/>
+          <a:p>
+            <a:endParaRPr lang="de-DE" sz="2800" b="0" strike="noStrike" spc="-1">
               <a:solidFill>
                 <a:srgbClr val="000000"/>
               </a:solidFill>
@@ -137,11 +242,12 @@
           </a:prstGeom>
         </p:spPr>
         <p:txBody>
-          <a:bodyPr lIns="0" rIns="0" tIns="0" bIns="0">
+          <a:bodyPr lIns="0" tIns="0" rIns="0" bIns="0">
             <a:normAutofit/>
           </a:bodyPr>
-          <a:p>
-            <a:endParaRPr b="0" lang="de-DE" sz="2800" spc="-1" strike="noStrike">
+          <a:lstStyle/>
+          <a:p>
+            <a:endParaRPr lang="de-DE" sz="2800" b="0" strike="noStrike" spc="-1">
               <a:solidFill>
                 <a:srgbClr val="000000"/>
               </a:solidFill>
@@ -152,11 +258,14 @@
       </p:sp>
     </p:spTree>
   </p:cSld>
+  <p:clrMapOvr>
+    <a:masterClrMapping/>
+  </p:clrMapOvr>
 </p:sldLayout>
 </file>
 
 <file path=ppt/slideLayouts/slideLayout11.xml><?xml version="1.0" encoding="utf-8"?>
-<p:sldLayout xmlns:a="http://schemas.openxmlformats.org/drawingml/2006/main" xmlns:p="http://schemas.openxmlformats.org/presentationml/2006/main" xmlns:r="http://schemas.openxmlformats.org/officeDocument/2006/relationships" xmlns:p14="http://schemas.microsoft.com/office/powerpoint/2010/main" xmlns:p15="http://schemas.microsoft.com/office/powerpoint/2012/main" xmlns:mc="http://schemas.openxmlformats.org/markup-compatibility/2006" type="fourObj" preserve="1">
+<p:sldLayout xmlns:a="http://schemas.openxmlformats.org/drawingml/2006/main" xmlns:r="http://schemas.openxmlformats.org/officeDocument/2006/relationships" xmlns:p="http://schemas.openxmlformats.org/presentationml/2006/main" type="fourObj" preserve="1">
   <p:cSld name="Title, 4 Content">
     <p:spTree>
       <p:nvGrpSpPr>
@@ -192,11 +301,12 @@
           </a:prstGeom>
         </p:spPr>
         <p:txBody>
-          <a:bodyPr lIns="0" rIns="0" tIns="0" bIns="0" anchor="ctr">
+          <a:bodyPr lIns="0" tIns="0" rIns="0" bIns="0" anchor="ctr">
             <a:spAutoFit/>
           </a:bodyPr>
-          <a:p>
-            <a:endParaRPr b="0" lang="de-DE" sz="1800" spc="-1" strike="noStrike">
+          <a:lstStyle/>
+          <a:p>
+            <a:endParaRPr lang="de-DE" sz="1800" b="0" strike="noStrike" spc="-1">
               <a:solidFill>
                 <a:srgbClr val="000000"/>
               </a:solidFill>
@@ -225,11 +335,12 @@
           </a:prstGeom>
         </p:spPr>
         <p:txBody>
-          <a:bodyPr lIns="0" rIns="0" tIns="0" bIns="0">
+          <a:bodyPr lIns="0" tIns="0" rIns="0" bIns="0">
             <a:normAutofit/>
           </a:bodyPr>
-          <a:p>
-            <a:endParaRPr b="0" lang="de-DE" sz="2800" spc="-1" strike="noStrike">
+          <a:lstStyle/>
+          <a:p>
+            <a:endParaRPr lang="de-DE" sz="2800" b="0" strike="noStrike" spc="-1">
               <a:solidFill>
                 <a:srgbClr val="000000"/>
               </a:solidFill>
@@ -258,11 +369,12 @@
           </a:prstGeom>
         </p:spPr>
         <p:txBody>
-          <a:bodyPr lIns="0" rIns="0" tIns="0" bIns="0">
+          <a:bodyPr lIns="0" tIns="0" rIns="0" bIns="0">
             <a:normAutofit/>
           </a:bodyPr>
-          <a:p>
-            <a:endParaRPr b="0" lang="de-DE" sz="2800" spc="-1" strike="noStrike">
+          <a:lstStyle/>
+          <a:p>
+            <a:endParaRPr lang="de-DE" sz="2800" b="0" strike="noStrike" spc="-1">
               <a:solidFill>
                 <a:srgbClr val="000000"/>
               </a:solidFill>
@@ -291,11 +403,12 @@
           </a:prstGeom>
         </p:spPr>
         <p:txBody>
-          <a:bodyPr lIns="0" rIns="0" tIns="0" bIns="0">
+          <a:bodyPr lIns="0" tIns="0" rIns="0" bIns="0">
             <a:normAutofit/>
           </a:bodyPr>
-          <a:p>
-            <a:endParaRPr b="0" lang="de-DE" sz="2800" spc="-1" strike="noStrike">
+          <a:lstStyle/>
+          <a:p>
+            <a:endParaRPr lang="de-DE" sz="2800" b="0" strike="noStrike" spc="-1">
               <a:solidFill>
                 <a:srgbClr val="000000"/>
               </a:solidFill>
@@ -324,11 +437,12 @@
           </a:prstGeom>
         </p:spPr>
         <p:txBody>
-          <a:bodyPr lIns="0" rIns="0" tIns="0" bIns="0">
+          <a:bodyPr lIns="0" tIns="0" rIns="0" bIns="0">
             <a:normAutofit/>
           </a:bodyPr>
-          <a:p>
-            <a:endParaRPr b="0" lang="de-DE" sz="2800" spc="-1" strike="noStrike">
+          <a:lstStyle/>
+          <a:p>
+            <a:endParaRPr lang="de-DE" sz="2800" b="0" strike="noStrike" spc="-1">
               <a:solidFill>
                 <a:srgbClr val="000000"/>
               </a:solidFill>
@@ -339,11 +453,14 @@
       </p:sp>
     </p:spTree>
   </p:cSld>
+  <p:clrMapOvr>
+    <a:masterClrMapping/>
+  </p:clrMapOvr>
 </p:sldLayout>
 </file>
 
 <file path=ppt/slideLayouts/slideLayout12.xml><?xml version="1.0" encoding="utf-8"?>
-<p:sldLayout xmlns:a="http://schemas.openxmlformats.org/drawingml/2006/main" xmlns:p="http://schemas.openxmlformats.org/presentationml/2006/main" xmlns:r="http://schemas.openxmlformats.org/officeDocument/2006/relationships" xmlns:p14="http://schemas.microsoft.com/office/powerpoint/2010/main" xmlns:p15="http://schemas.microsoft.com/office/powerpoint/2012/main" xmlns:mc="http://schemas.openxmlformats.org/markup-compatibility/2006" type="blank" preserve="1">
+<p:sldLayout xmlns:a="http://schemas.openxmlformats.org/drawingml/2006/main" xmlns:r="http://schemas.openxmlformats.org/officeDocument/2006/relationships" xmlns:p="http://schemas.openxmlformats.org/presentationml/2006/main" type="blank" preserve="1">
   <p:cSld name="Title, 6 Content">
     <p:spTree>
       <p:nvGrpSpPr>
@@ -379,11 +496,12 @@
           </a:prstGeom>
         </p:spPr>
         <p:txBody>
-          <a:bodyPr lIns="0" rIns="0" tIns="0" bIns="0" anchor="ctr">
+          <a:bodyPr lIns="0" tIns="0" rIns="0" bIns="0" anchor="ctr">
             <a:spAutoFit/>
           </a:bodyPr>
-          <a:p>
-            <a:endParaRPr b="0" lang="de-DE" sz="1800" spc="-1" strike="noStrike">
+          <a:lstStyle/>
+          <a:p>
+            <a:endParaRPr lang="de-DE" sz="1800" b="0" strike="noStrike" spc="-1">
               <a:solidFill>
                 <a:srgbClr val="000000"/>
               </a:solidFill>
@@ -412,11 +530,12 @@
           </a:prstGeom>
         </p:spPr>
         <p:txBody>
-          <a:bodyPr lIns="0" rIns="0" tIns="0" bIns="0">
+          <a:bodyPr lIns="0" tIns="0" rIns="0" bIns="0">
             <a:normAutofit/>
           </a:bodyPr>
-          <a:p>
-            <a:endParaRPr b="0" lang="de-DE" sz="2800" spc="-1" strike="noStrike">
+          <a:lstStyle/>
+          <a:p>
+            <a:endParaRPr lang="de-DE" sz="2800" b="0" strike="noStrike" spc="-1">
               <a:solidFill>
                 <a:srgbClr val="000000"/>
               </a:solidFill>
@@ -445,11 +564,12 @@
           </a:prstGeom>
         </p:spPr>
         <p:txBody>
-          <a:bodyPr lIns="0" rIns="0" tIns="0" bIns="0">
+          <a:bodyPr lIns="0" tIns="0" rIns="0" bIns="0">
             <a:normAutofit/>
           </a:bodyPr>
-          <a:p>
-            <a:endParaRPr b="0" lang="de-DE" sz="2800" spc="-1" strike="noStrike">
+          <a:lstStyle/>
+          <a:p>
+            <a:endParaRPr lang="de-DE" sz="2800" b="0" strike="noStrike" spc="-1">
               <a:solidFill>
                 <a:srgbClr val="000000"/>
               </a:solidFill>
@@ -478,11 +598,12 @@
           </a:prstGeom>
         </p:spPr>
         <p:txBody>
-          <a:bodyPr lIns="0" rIns="0" tIns="0" bIns="0">
+          <a:bodyPr lIns="0" tIns="0" rIns="0" bIns="0">
             <a:normAutofit/>
           </a:bodyPr>
-          <a:p>
-            <a:endParaRPr b="0" lang="de-DE" sz="2800" spc="-1" strike="noStrike">
+          <a:lstStyle/>
+          <a:p>
+            <a:endParaRPr lang="de-DE" sz="2800" b="0" strike="noStrike" spc="-1">
               <a:solidFill>
                 <a:srgbClr val="000000"/>
               </a:solidFill>
@@ -511,11 +632,12 @@
           </a:prstGeom>
         </p:spPr>
         <p:txBody>
-          <a:bodyPr lIns="0" rIns="0" tIns="0" bIns="0">
+          <a:bodyPr lIns="0" tIns="0" rIns="0" bIns="0">
             <a:normAutofit/>
           </a:bodyPr>
-          <a:p>
-            <a:endParaRPr b="0" lang="de-DE" sz="2800" spc="-1" strike="noStrike">
+          <a:lstStyle/>
+          <a:p>
+            <a:endParaRPr lang="de-DE" sz="2800" b="0" strike="noStrike" spc="-1">
               <a:solidFill>
                 <a:srgbClr val="000000"/>
               </a:solidFill>
@@ -544,11 +666,12 @@
           </a:prstGeom>
         </p:spPr>
         <p:txBody>
-          <a:bodyPr lIns="0" rIns="0" tIns="0" bIns="0">
+          <a:bodyPr lIns="0" tIns="0" rIns="0" bIns="0">
             <a:normAutofit/>
           </a:bodyPr>
-          <a:p>
-            <a:endParaRPr b="0" lang="de-DE" sz="2800" spc="-1" strike="noStrike">
+          <a:lstStyle/>
+          <a:p>
+            <a:endParaRPr lang="de-DE" sz="2800" b="0" strike="noStrike" spc="-1">
               <a:solidFill>
                 <a:srgbClr val="000000"/>
               </a:solidFill>
@@ -577,11 +700,12 @@
           </a:prstGeom>
         </p:spPr>
         <p:txBody>
-          <a:bodyPr lIns="0" rIns="0" tIns="0" bIns="0">
+          <a:bodyPr lIns="0" tIns="0" rIns="0" bIns="0">
             <a:normAutofit/>
           </a:bodyPr>
-          <a:p>
-            <a:endParaRPr b="0" lang="de-DE" sz="2800" spc="-1" strike="noStrike">
+          <a:lstStyle/>
+          <a:p>
+            <a:endParaRPr lang="de-DE" sz="2800" b="0" strike="noStrike" spc="-1">
               <a:solidFill>
                 <a:srgbClr val="000000"/>
               </a:solidFill>
@@ -592,11 +716,14 @@
       </p:sp>
     </p:spTree>
   </p:cSld>
+  <p:clrMapOvr>
+    <a:masterClrMapping/>
+  </p:clrMapOvr>
 </p:sldLayout>
 </file>
 
 <file path=ppt/slideLayouts/slideLayout2.xml><?xml version="1.0" encoding="utf-8"?>
-<p:sldLayout xmlns:a="http://schemas.openxmlformats.org/drawingml/2006/main" xmlns:p="http://schemas.openxmlformats.org/presentationml/2006/main" xmlns:r="http://schemas.openxmlformats.org/officeDocument/2006/relationships" xmlns:p14="http://schemas.microsoft.com/office/powerpoint/2010/main" xmlns:p15="http://schemas.microsoft.com/office/powerpoint/2012/main" xmlns:mc="http://schemas.openxmlformats.org/markup-compatibility/2006" type="tx" preserve="1">
+<p:sldLayout xmlns:a="http://schemas.openxmlformats.org/drawingml/2006/main" xmlns:r="http://schemas.openxmlformats.org/officeDocument/2006/relationships" xmlns:p="http://schemas.openxmlformats.org/presentationml/2006/main" type="tx" preserve="1">
   <p:cSld name="Title Slide">
     <p:spTree>
       <p:nvGrpSpPr>
@@ -632,11 +759,12 @@
           </a:prstGeom>
         </p:spPr>
         <p:txBody>
-          <a:bodyPr lIns="0" rIns="0" tIns="0" bIns="0" anchor="ctr">
+          <a:bodyPr lIns="0" tIns="0" rIns="0" bIns="0" anchor="ctr">
             <a:spAutoFit/>
           </a:bodyPr>
-          <a:p>
-            <a:endParaRPr b="0" lang="de-DE" sz="1800" spc="-1" strike="noStrike">
+          <a:lstStyle/>
+          <a:p>
+            <a:endParaRPr lang="de-DE" sz="1800" b="0" strike="noStrike" spc="-1">
               <a:solidFill>
                 <a:srgbClr val="000000"/>
               </a:solidFill>
@@ -665,12 +793,13 @@
           </a:prstGeom>
         </p:spPr>
         <p:txBody>
-          <a:bodyPr lIns="0" rIns="0" tIns="0" bIns="0" anchor="ctr">
+          <a:bodyPr lIns="0" tIns="0" rIns="0" bIns="0" anchor="ctr">
             <a:spAutoFit/>
           </a:bodyPr>
+          <a:lstStyle/>
           <a:p>
             <a:pPr algn="ctr"/>
-            <a:endParaRPr b="0" lang="de-DE" sz="3200" spc="-1" strike="noStrike">
+            <a:endParaRPr lang="de-DE" sz="3200" b="0" strike="noStrike" spc="-1">
               <a:latin typeface="Arial"/>
             </a:endParaRPr>
           </a:p>
@@ -678,11 +807,14 @@
       </p:sp>
     </p:spTree>
   </p:cSld>
+  <p:clrMapOvr>
+    <a:masterClrMapping/>
+  </p:clrMapOvr>
 </p:sldLayout>
 </file>
 
 <file path=ppt/slideLayouts/slideLayout3.xml><?xml version="1.0" encoding="utf-8"?>
-<p:sldLayout xmlns:a="http://schemas.openxmlformats.org/drawingml/2006/main" xmlns:p="http://schemas.openxmlformats.org/presentationml/2006/main" xmlns:r="http://schemas.openxmlformats.org/officeDocument/2006/relationships" xmlns:p14="http://schemas.microsoft.com/office/powerpoint/2010/main" xmlns:p15="http://schemas.microsoft.com/office/powerpoint/2012/main" xmlns:mc="http://schemas.openxmlformats.org/markup-compatibility/2006" type="obj" preserve="1">
+<p:sldLayout xmlns:a="http://schemas.openxmlformats.org/drawingml/2006/main" xmlns:r="http://schemas.openxmlformats.org/officeDocument/2006/relationships" xmlns:p="http://schemas.openxmlformats.org/presentationml/2006/main" type="obj" preserve="1">
   <p:cSld name="Title, Content">
     <p:spTree>
       <p:nvGrpSpPr>
@@ -718,11 +850,12 @@
           </a:prstGeom>
         </p:spPr>
         <p:txBody>
-          <a:bodyPr lIns="0" rIns="0" tIns="0" bIns="0" anchor="ctr">
+          <a:bodyPr lIns="0" tIns="0" rIns="0" bIns="0" anchor="ctr">
             <a:spAutoFit/>
           </a:bodyPr>
-          <a:p>
-            <a:endParaRPr b="0" lang="de-DE" sz="1800" spc="-1" strike="noStrike">
+          <a:lstStyle/>
+          <a:p>
+            <a:endParaRPr lang="de-DE" sz="1800" b="0" strike="noStrike" spc="-1">
               <a:solidFill>
                 <a:srgbClr val="000000"/>
               </a:solidFill>
@@ -751,11 +884,12 @@
           </a:prstGeom>
         </p:spPr>
         <p:txBody>
-          <a:bodyPr lIns="0" rIns="0" tIns="0" bIns="0">
+          <a:bodyPr lIns="0" tIns="0" rIns="0" bIns="0">
             <a:normAutofit/>
           </a:bodyPr>
-          <a:p>
-            <a:endParaRPr b="0" lang="de-DE" sz="2800" spc="-1" strike="noStrike">
+          <a:lstStyle/>
+          <a:p>
+            <a:endParaRPr lang="de-DE" sz="2800" b="0" strike="noStrike" spc="-1">
               <a:solidFill>
                 <a:srgbClr val="000000"/>
               </a:solidFill>
@@ -766,11 +900,14 @@
       </p:sp>
     </p:spTree>
   </p:cSld>
+  <p:clrMapOvr>
+    <a:masterClrMapping/>
+  </p:clrMapOvr>
 </p:sldLayout>
 </file>
 
 <file path=ppt/slideLayouts/slideLayout4.xml><?xml version="1.0" encoding="utf-8"?>
-<p:sldLayout xmlns:a="http://schemas.openxmlformats.org/drawingml/2006/main" xmlns:p="http://schemas.openxmlformats.org/presentationml/2006/main" xmlns:r="http://schemas.openxmlformats.org/officeDocument/2006/relationships" xmlns:p14="http://schemas.microsoft.com/office/powerpoint/2010/main" xmlns:p15="http://schemas.microsoft.com/office/powerpoint/2012/main" xmlns:mc="http://schemas.openxmlformats.org/markup-compatibility/2006" type="twoObj" preserve="1">
+<p:sldLayout xmlns:a="http://schemas.openxmlformats.org/drawingml/2006/main" xmlns:r="http://schemas.openxmlformats.org/officeDocument/2006/relationships" xmlns:p="http://schemas.openxmlformats.org/presentationml/2006/main" type="twoObj" preserve="1">
   <p:cSld name="Title, 2 Content">
     <p:spTree>
       <p:nvGrpSpPr>
@@ -806,11 +943,12 @@
           </a:prstGeom>
         </p:spPr>
         <p:txBody>
-          <a:bodyPr lIns="0" rIns="0" tIns="0" bIns="0" anchor="ctr">
+          <a:bodyPr lIns="0" tIns="0" rIns="0" bIns="0" anchor="ctr">
             <a:spAutoFit/>
           </a:bodyPr>
-          <a:p>
-            <a:endParaRPr b="0" lang="de-DE" sz="1800" spc="-1" strike="noStrike">
+          <a:lstStyle/>
+          <a:p>
+            <a:endParaRPr lang="de-DE" sz="1800" b="0" strike="noStrike" spc="-1">
               <a:solidFill>
                 <a:srgbClr val="000000"/>
               </a:solidFill>
@@ -839,11 +977,12 @@
           </a:prstGeom>
         </p:spPr>
         <p:txBody>
-          <a:bodyPr lIns="0" rIns="0" tIns="0" bIns="0">
+          <a:bodyPr lIns="0" tIns="0" rIns="0" bIns="0">
             <a:normAutofit/>
           </a:bodyPr>
-          <a:p>
-            <a:endParaRPr b="0" lang="de-DE" sz="2800" spc="-1" strike="noStrike">
+          <a:lstStyle/>
+          <a:p>
+            <a:endParaRPr lang="de-DE" sz="2800" b="0" strike="noStrike" spc="-1">
               <a:solidFill>
                 <a:srgbClr val="000000"/>
               </a:solidFill>
@@ -872,11 +1011,12 @@
           </a:prstGeom>
         </p:spPr>
         <p:txBody>
-          <a:bodyPr lIns="0" rIns="0" tIns="0" bIns="0">
+          <a:bodyPr lIns="0" tIns="0" rIns="0" bIns="0">
             <a:normAutofit/>
           </a:bodyPr>
-          <a:p>
-            <a:endParaRPr b="0" lang="de-DE" sz="2800" spc="-1" strike="noStrike">
+          <a:lstStyle/>
+          <a:p>
+            <a:endParaRPr lang="de-DE" sz="2800" b="0" strike="noStrike" spc="-1">
               <a:solidFill>
                 <a:srgbClr val="000000"/>
               </a:solidFill>
@@ -887,11 +1027,14 @@
       </p:sp>
     </p:spTree>
   </p:cSld>
+  <p:clrMapOvr>
+    <a:masterClrMapping/>
+  </p:clrMapOvr>
 </p:sldLayout>
 </file>
 
 <file path=ppt/slideLayouts/slideLayout5.xml><?xml version="1.0" encoding="utf-8"?>
-<p:sldLayout xmlns:a="http://schemas.openxmlformats.org/drawingml/2006/main" xmlns:p="http://schemas.openxmlformats.org/presentationml/2006/main" xmlns:r="http://schemas.openxmlformats.org/officeDocument/2006/relationships" xmlns:p14="http://schemas.microsoft.com/office/powerpoint/2010/main" xmlns:p15="http://schemas.microsoft.com/office/powerpoint/2012/main" xmlns:mc="http://schemas.openxmlformats.org/markup-compatibility/2006" type="titleOnly" preserve="1">
+<p:sldLayout xmlns:a="http://schemas.openxmlformats.org/drawingml/2006/main" xmlns:r="http://schemas.openxmlformats.org/officeDocument/2006/relationships" xmlns:p="http://schemas.openxmlformats.org/presentationml/2006/main" type="titleOnly" preserve="1">
   <p:cSld name="Title Only">
     <p:spTree>
       <p:nvGrpSpPr>
@@ -927,11 +1070,12 @@
           </a:prstGeom>
         </p:spPr>
         <p:txBody>
-          <a:bodyPr lIns="0" rIns="0" tIns="0" bIns="0" anchor="ctr">
+          <a:bodyPr lIns="0" tIns="0" rIns="0" bIns="0" anchor="ctr">
             <a:spAutoFit/>
           </a:bodyPr>
-          <a:p>
-            <a:endParaRPr b="0" lang="de-DE" sz="1800" spc="-1" strike="noStrike">
+          <a:lstStyle/>
+          <a:p>
+            <a:endParaRPr lang="de-DE" sz="1800" b="0" strike="noStrike" spc="-1">
               <a:solidFill>
                 <a:srgbClr val="000000"/>
               </a:solidFill>
@@ -942,11 +1086,14 @@
       </p:sp>
     </p:spTree>
   </p:cSld>
+  <p:clrMapOvr>
+    <a:masterClrMapping/>
+  </p:clrMapOvr>
 </p:sldLayout>
 </file>
 
 <file path=ppt/slideLayouts/slideLayout6.xml><?xml version="1.0" encoding="utf-8"?>
-<p:sldLayout xmlns:a="http://schemas.openxmlformats.org/drawingml/2006/main" xmlns:p="http://schemas.openxmlformats.org/presentationml/2006/main" xmlns:r="http://schemas.openxmlformats.org/officeDocument/2006/relationships" xmlns:p14="http://schemas.microsoft.com/office/powerpoint/2010/main" xmlns:p15="http://schemas.microsoft.com/office/powerpoint/2012/main" xmlns:mc="http://schemas.openxmlformats.org/markup-compatibility/2006" type="objOnly" preserve="1">
+<p:sldLayout xmlns:a="http://schemas.openxmlformats.org/drawingml/2006/main" xmlns:r="http://schemas.openxmlformats.org/officeDocument/2006/relationships" xmlns:p="http://schemas.openxmlformats.org/presentationml/2006/main" type="objOnly" preserve="1">
   <p:cSld name="Centered Text">
     <p:spTree>
       <p:nvGrpSpPr>
@@ -982,12 +1129,13 @@
           </a:prstGeom>
         </p:spPr>
         <p:txBody>
-          <a:bodyPr lIns="0" rIns="0" tIns="0" bIns="0" anchor="ctr">
+          <a:bodyPr lIns="0" tIns="0" rIns="0" bIns="0" anchor="ctr">
             <a:spAutoFit/>
           </a:bodyPr>
+          <a:lstStyle/>
           <a:p>
             <a:pPr algn="ctr"/>
-            <a:endParaRPr b="0" lang="de-DE" sz="3200" spc="-1" strike="noStrike">
+            <a:endParaRPr lang="de-DE" sz="3200" b="0" strike="noStrike" spc="-1">
               <a:latin typeface="Arial"/>
             </a:endParaRPr>
           </a:p>
@@ -995,11 +1143,14 @@
       </p:sp>
     </p:spTree>
   </p:cSld>
+  <p:clrMapOvr>
+    <a:masterClrMapping/>
+  </p:clrMapOvr>
 </p:sldLayout>
 </file>
 
 <file path=ppt/slideLayouts/slideLayout7.xml><?xml version="1.0" encoding="utf-8"?>
-<p:sldLayout xmlns:a="http://schemas.openxmlformats.org/drawingml/2006/main" xmlns:p="http://schemas.openxmlformats.org/presentationml/2006/main" xmlns:r="http://schemas.openxmlformats.org/officeDocument/2006/relationships" xmlns:p14="http://schemas.microsoft.com/office/powerpoint/2010/main" xmlns:p15="http://schemas.microsoft.com/office/powerpoint/2012/main" xmlns:mc="http://schemas.openxmlformats.org/markup-compatibility/2006" type="twoObjAndObj" preserve="1">
+<p:sldLayout xmlns:a="http://schemas.openxmlformats.org/drawingml/2006/main" xmlns:r="http://schemas.openxmlformats.org/officeDocument/2006/relationships" xmlns:p="http://schemas.openxmlformats.org/presentationml/2006/main" type="twoObjAndObj" preserve="1">
   <p:cSld name="Title, 2 Content and Content">
     <p:spTree>
       <p:nvGrpSpPr>
@@ -1035,11 +1186,12 @@
           </a:prstGeom>
         </p:spPr>
         <p:txBody>
-          <a:bodyPr lIns="0" rIns="0" tIns="0" bIns="0" anchor="ctr">
+          <a:bodyPr lIns="0" tIns="0" rIns="0" bIns="0" anchor="ctr">
             <a:spAutoFit/>
           </a:bodyPr>
-          <a:p>
-            <a:endParaRPr b="0" lang="de-DE" sz="1800" spc="-1" strike="noStrike">
+          <a:lstStyle/>
+          <a:p>
+            <a:endParaRPr lang="de-DE" sz="1800" b="0" strike="noStrike" spc="-1">
               <a:solidFill>
                 <a:srgbClr val="000000"/>
               </a:solidFill>
@@ -1068,11 +1220,12 @@
           </a:prstGeom>
         </p:spPr>
         <p:txBody>
-          <a:bodyPr lIns="0" rIns="0" tIns="0" bIns="0">
+          <a:bodyPr lIns="0" tIns="0" rIns="0" bIns="0">
             <a:normAutofit/>
           </a:bodyPr>
-          <a:p>
-            <a:endParaRPr b="0" lang="de-DE" sz="2800" spc="-1" strike="noStrike">
+          <a:lstStyle/>
+          <a:p>
+            <a:endParaRPr lang="de-DE" sz="2800" b="0" strike="noStrike" spc="-1">
               <a:solidFill>
                 <a:srgbClr val="000000"/>
               </a:solidFill>
@@ -1101,11 +1254,12 @@
           </a:prstGeom>
         </p:spPr>
         <p:txBody>
-          <a:bodyPr lIns="0" rIns="0" tIns="0" bIns="0">
+          <a:bodyPr lIns="0" tIns="0" rIns="0" bIns="0">
             <a:normAutofit/>
           </a:bodyPr>
-          <a:p>
-            <a:endParaRPr b="0" lang="de-DE" sz="2800" spc="-1" strike="noStrike">
+          <a:lstStyle/>
+          <a:p>
+            <a:endParaRPr lang="de-DE" sz="2800" b="0" strike="noStrike" spc="-1">
               <a:solidFill>
                 <a:srgbClr val="000000"/>
               </a:solidFill>
@@ -1134,11 +1288,12 @@
           </a:prstGeom>
         </p:spPr>
         <p:txBody>
-          <a:bodyPr lIns="0" rIns="0" tIns="0" bIns="0">
+          <a:bodyPr lIns="0" tIns="0" rIns="0" bIns="0">
             <a:normAutofit/>
           </a:bodyPr>
-          <a:p>
-            <a:endParaRPr b="0" lang="de-DE" sz="2800" spc="-1" strike="noStrike">
+          <a:lstStyle/>
+          <a:p>
+            <a:endParaRPr lang="de-DE" sz="2800" b="0" strike="noStrike" spc="-1">
               <a:solidFill>
                 <a:srgbClr val="000000"/>
               </a:solidFill>
@@ -1149,11 +1304,14 @@
       </p:sp>
     </p:spTree>
   </p:cSld>
+  <p:clrMapOvr>
+    <a:masterClrMapping/>
+  </p:clrMapOvr>
 </p:sldLayout>
 </file>
 
 <file path=ppt/slideLayouts/slideLayout8.xml><?xml version="1.0" encoding="utf-8"?>
-<p:sldLayout xmlns:a="http://schemas.openxmlformats.org/drawingml/2006/main" xmlns:p="http://schemas.openxmlformats.org/presentationml/2006/main" xmlns:r="http://schemas.openxmlformats.org/officeDocument/2006/relationships" xmlns:p14="http://schemas.microsoft.com/office/powerpoint/2010/main" xmlns:p15="http://schemas.microsoft.com/office/powerpoint/2012/main" xmlns:mc="http://schemas.openxmlformats.org/markup-compatibility/2006" type="objAndTwoObj" preserve="1">
+<p:sldLayout xmlns:a="http://schemas.openxmlformats.org/drawingml/2006/main" xmlns:r="http://schemas.openxmlformats.org/officeDocument/2006/relationships" xmlns:p="http://schemas.openxmlformats.org/presentationml/2006/main" type="objAndTwoObj" preserve="1">
   <p:cSld name="Title Content and 2 Content">
     <p:spTree>
       <p:nvGrpSpPr>
@@ -1189,11 +1347,12 @@
           </a:prstGeom>
         </p:spPr>
         <p:txBody>
-          <a:bodyPr lIns="0" rIns="0" tIns="0" bIns="0" anchor="ctr">
+          <a:bodyPr lIns="0" tIns="0" rIns="0" bIns="0" anchor="ctr">
             <a:spAutoFit/>
           </a:bodyPr>
-          <a:p>
-            <a:endParaRPr b="0" lang="de-DE" sz="1800" spc="-1" strike="noStrike">
+          <a:lstStyle/>
+          <a:p>
+            <a:endParaRPr lang="de-DE" sz="1800" b="0" strike="noStrike" spc="-1">
               <a:solidFill>
                 <a:srgbClr val="000000"/>
               </a:solidFill>
@@ -1222,11 +1381,12 @@
           </a:prstGeom>
         </p:spPr>
         <p:txBody>
-          <a:bodyPr lIns="0" rIns="0" tIns="0" bIns="0">
+          <a:bodyPr lIns="0" tIns="0" rIns="0" bIns="0">
             <a:normAutofit/>
           </a:bodyPr>
-          <a:p>
-            <a:endParaRPr b="0" lang="de-DE" sz="2800" spc="-1" strike="noStrike">
+          <a:lstStyle/>
+          <a:p>
+            <a:endParaRPr lang="de-DE" sz="2800" b="0" strike="noStrike" spc="-1">
               <a:solidFill>
                 <a:srgbClr val="000000"/>
               </a:solidFill>
@@ -1255,11 +1415,12 @@
           </a:prstGeom>
         </p:spPr>
         <p:txBody>
-          <a:bodyPr lIns="0" rIns="0" tIns="0" bIns="0">
+          <a:bodyPr lIns="0" tIns="0" rIns="0" bIns="0">
             <a:normAutofit/>
           </a:bodyPr>
-          <a:p>
-            <a:endParaRPr b="0" lang="de-DE" sz="2800" spc="-1" strike="noStrike">
+          <a:lstStyle/>
+          <a:p>
+            <a:endParaRPr lang="de-DE" sz="2800" b="0" strike="noStrike" spc="-1">
               <a:solidFill>
                 <a:srgbClr val="000000"/>
               </a:solidFill>
@@ -1288,11 +1449,12 @@
           </a:prstGeom>
         </p:spPr>
         <p:txBody>
-          <a:bodyPr lIns="0" rIns="0" tIns="0" bIns="0">
+          <a:bodyPr lIns="0" tIns="0" rIns="0" bIns="0">
             <a:normAutofit/>
           </a:bodyPr>
-          <a:p>
-            <a:endParaRPr b="0" lang="de-DE" sz="2800" spc="-1" strike="noStrike">
+          <a:lstStyle/>
+          <a:p>
+            <a:endParaRPr lang="de-DE" sz="2800" b="0" strike="noStrike" spc="-1">
               <a:solidFill>
                 <a:srgbClr val="000000"/>
               </a:solidFill>
@@ -1303,11 +1465,14 @@
       </p:sp>
     </p:spTree>
   </p:cSld>
+  <p:clrMapOvr>
+    <a:masterClrMapping/>
+  </p:clrMapOvr>
 </p:sldLayout>
 </file>
 
 <file path=ppt/slideLayouts/slideLayout9.xml><?xml version="1.0" encoding="utf-8"?>
-<p:sldLayout xmlns:a="http://schemas.openxmlformats.org/drawingml/2006/main" xmlns:p="http://schemas.openxmlformats.org/presentationml/2006/main" xmlns:r="http://schemas.openxmlformats.org/officeDocument/2006/relationships" xmlns:p14="http://schemas.microsoft.com/office/powerpoint/2010/main" xmlns:p15="http://schemas.microsoft.com/office/powerpoint/2012/main" xmlns:mc="http://schemas.openxmlformats.org/markup-compatibility/2006" type="twoObjOverTx" preserve="1">
+<p:sldLayout xmlns:a="http://schemas.openxmlformats.org/drawingml/2006/main" xmlns:r="http://schemas.openxmlformats.org/officeDocument/2006/relationships" xmlns:p="http://schemas.openxmlformats.org/presentationml/2006/main" type="twoObjOverTx" preserve="1">
   <p:cSld name="Title, 2 Content over Content">
     <p:spTree>
       <p:nvGrpSpPr>
@@ -1343,11 +1508,12 @@
           </a:prstGeom>
         </p:spPr>
         <p:txBody>
-          <a:bodyPr lIns="0" rIns="0" tIns="0" bIns="0" anchor="ctr">
+          <a:bodyPr lIns="0" tIns="0" rIns="0" bIns="0" anchor="ctr">
             <a:spAutoFit/>
           </a:bodyPr>
-          <a:p>
-            <a:endParaRPr b="0" lang="de-DE" sz="1800" spc="-1" strike="noStrike">
+          <a:lstStyle/>
+          <a:p>
+            <a:endParaRPr lang="de-DE" sz="1800" b="0" strike="noStrike" spc="-1">
               <a:solidFill>
                 <a:srgbClr val="000000"/>
               </a:solidFill>
@@ -1376,11 +1542,12 @@
           </a:prstGeom>
         </p:spPr>
         <p:txBody>
-          <a:bodyPr lIns="0" rIns="0" tIns="0" bIns="0">
+          <a:bodyPr lIns="0" tIns="0" rIns="0" bIns="0">
             <a:normAutofit/>
           </a:bodyPr>
-          <a:p>
-            <a:endParaRPr b="0" lang="de-DE" sz="2800" spc="-1" strike="noStrike">
+          <a:lstStyle/>
+          <a:p>
+            <a:endParaRPr lang="de-DE" sz="2800" b="0" strike="noStrike" spc="-1">
               <a:solidFill>
                 <a:srgbClr val="000000"/>
               </a:solidFill>
@@ -1409,11 +1576,12 @@
           </a:prstGeom>
         </p:spPr>
         <p:txBody>
-          <a:bodyPr lIns="0" rIns="0" tIns="0" bIns="0">
+          <a:bodyPr lIns="0" tIns="0" rIns="0" bIns="0">
             <a:normAutofit/>
           </a:bodyPr>
-          <a:p>
-            <a:endParaRPr b="0" lang="de-DE" sz="2800" spc="-1" strike="noStrike">
+          <a:lstStyle/>
+          <a:p>
+            <a:endParaRPr lang="de-DE" sz="2800" b="0" strike="noStrike" spc="-1">
               <a:solidFill>
                 <a:srgbClr val="000000"/>
               </a:solidFill>
@@ -1442,11 +1610,12 @@
           </a:prstGeom>
         </p:spPr>
         <p:txBody>
-          <a:bodyPr lIns="0" rIns="0" tIns="0" bIns="0">
+          <a:bodyPr lIns="0" tIns="0" rIns="0" bIns="0">
             <a:normAutofit/>
           </a:bodyPr>
-          <a:p>
-            <a:endParaRPr b="0" lang="de-DE" sz="2800" spc="-1" strike="noStrike">
+          <a:lstStyle/>
+          <a:p>
+            <a:endParaRPr lang="de-DE" sz="2800" b="0" strike="noStrike" spc="-1">
               <a:solidFill>
                 <a:srgbClr val="000000"/>
               </a:solidFill>
@@ -1457,17 +1626,21 @@
       </p:sp>
     </p:spTree>
   </p:cSld>
+  <p:clrMapOvr>
+    <a:masterClrMapping/>
+  </p:clrMapOvr>
 </p:sldLayout>
 </file>
 
 <file path=ppt/slideMasters/slideMaster1.xml><?xml version="1.0" encoding="utf-8"?>
-<p:sldMaster xmlns:a="http://schemas.openxmlformats.org/drawingml/2006/main" xmlns:p="http://schemas.openxmlformats.org/presentationml/2006/main" xmlns:r="http://schemas.openxmlformats.org/officeDocument/2006/relationships" xmlns:p14="http://schemas.microsoft.com/office/powerpoint/2010/main" xmlns:p15="http://schemas.microsoft.com/office/powerpoint/2012/main" xmlns:mc="http://schemas.openxmlformats.org/markup-compatibility/2006">
+<p:sldMaster xmlns:a="http://schemas.openxmlformats.org/drawingml/2006/main" xmlns:r="http://schemas.openxmlformats.org/officeDocument/2006/relationships" xmlns:p="http://schemas.openxmlformats.org/presentationml/2006/main">
   <p:cSld>
     <p:bg>
       <p:bgPr>
         <a:solidFill>
-          <a:srgbClr val="ffffff"/>
+          <a:srgbClr val="FFFFFF"/>
         </a:solidFill>
+        <a:effectLst/>
       </p:bgPr>
     </p:bg>
     <p:spTree>
@@ -1486,12 +1659,12 @@
       </p:grpSpPr>
       <p:pic>
         <p:nvPicPr>
-          <p:cNvPr id="0" name="Grafik 4" descr=""/>
+          <p:cNvPr id="5" name="Grafik 4"/>
           <p:cNvPicPr/>
           <p:nvPr/>
         </p:nvPicPr>
         <p:blipFill>
-          <a:blip r:embed="rId2"/>
+          <a:blip r:embed="rId14"/>
           <a:stretch/>
         </p:blipFill>
         <p:spPr>
@@ -1509,7 +1682,7 @@
       </p:pic>
       <p:sp>
         <p:nvSpPr>
-          <p:cNvPr id="1" name="CustomShape 1"/>
+          <p:cNvPr id="6" name="CustomShape 1"/>
           <p:cNvSpPr/>
           <p:nvPr/>
         </p:nvSpPr>
@@ -1599,12 +1772,13 @@
           </a:prstGeom>
         </p:spPr>
         <p:txBody>
-          <a:bodyPr lIns="0" rIns="0" tIns="0" bIns="0" anchor="ctr">
+          <a:bodyPr lIns="0" tIns="0" rIns="0" bIns="0" anchor="ctr">
             <a:noAutofit/>
           </a:bodyPr>
-          <a:p>
-            <a:r>
-              <a:rPr b="0" lang="de-DE" sz="1800" spc="-1" strike="noStrike">
+          <a:lstStyle/>
+          <a:p>
+            <a:r>
+              <a:rPr lang="de-DE" sz="1800" b="0" strike="noStrike" spc="-1">
                 <a:solidFill>
                   <a:srgbClr val="000000"/>
                 </a:solidFill>
@@ -1612,12 +1786,6 @@
               </a:rPr>
               <a:t>Click to edit the title text format</a:t>
             </a:r>
-            <a:endParaRPr b="0" lang="de-DE" sz="1800" spc="-1" strike="noStrike">
-              <a:solidFill>
-                <a:srgbClr val="000000"/>
-              </a:solidFill>
-              <a:latin typeface="Arial"/>
-            </a:endParaRPr>
           </a:p>
         </p:txBody>
       </p:sp>
@@ -1641,9 +1809,10 @@
           </a:prstGeom>
         </p:spPr>
         <p:txBody>
-          <a:bodyPr lIns="0" rIns="0" tIns="0" bIns="0">
+          <a:bodyPr lIns="0" tIns="0" rIns="0" bIns="0">
             <a:normAutofit/>
           </a:bodyPr>
+          <a:lstStyle/>
           <a:p>
             <a:pPr marL="432000" indent="-324000">
               <a:spcBef>
@@ -1657,7 +1826,7 @@
               <a:buChar char=""/>
             </a:pPr>
             <a:r>
-              <a:rPr b="0" lang="de-DE" sz="2800" spc="-1" strike="noStrike">
+              <a:rPr lang="de-DE" sz="2800" b="0" strike="noStrike" spc="-1">
                 <a:solidFill>
                   <a:srgbClr val="000000"/>
                 </a:solidFill>
@@ -1665,15 +1834,9 @@
               </a:rPr>
               <a:t>Click to edit the outline text format</a:t>
             </a:r>
-            <a:endParaRPr b="0" lang="de-DE" sz="2800" spc="-1" strike="noStrike">
-              <a:solidFill>
-                <a:srgbClr val="000000"/>
-              </a:solidFill>
-              <a:latin typeface="Arial"/>
-            </a:endParaRPr>
-          </a:p>
-          <a:p>
-            <a:pPr lvl="1" marL="864000" indent="-324000">
+          </a:p>
+          <a:p>
+            <a:pPr marL="864000" lvl="1" indent="-324000">
               <a:spcBef>
                 <a:spcPts val="1134"/>
               </a:spcBef>
@@ -1685,7 +1848,7 @@
               <a:buChar char=""/>
             </a:pPr>
             <a:r>
-              <a:rPr b="0" lang="de-DE" sz="2000" spc="-1" strike="noStrike">
+              <a:rPr lang="de-DE" sz="2000" b="0" strike="noStrike" spc="-1">
                 <a:solidFill>
                   <a:srgbClr val="000000"/>
                 </a:solidFill>
@@ -1693,15 +1856,9 @@
               </a:rPr>
               <a:t>Second Outline Level</a:t>
             </a:r>
-            <a:endParaRPr b="0" lang="de-DE" sz="2000" spc="-1" strike="noStrike">
-              <a:solidFill>
-                <a:srgbClr val="000000"/>
-              </a:solidFill>
-              <a:latin typeface="Arial"/>
-            </a:endParaRPr>
-          </a:p>
-          <a:p>
-            <a:pPr lvl="2" marL="1296000" indent="-288000">
+          </a:p>
+          <a:p>
+            <a:pPr marL="1296000" lvl="2" indent="-288000">
               <a:spcBef>
                 <a:spcPts val="850"/>
               </a:spcBef>
@@ -1713,7 +1870,7 @@
               <a:buChar char=""/>
             </a:pPr>
             <a:r>
-              <a:rPr b="0" lang="de-DE" sz="1800" spc="-1" strike="noStrike">
+              <a:rPr lang="de-DE" sz="1800" b="0" strike="noStrike" spc="-1">
                 <a:solidFill>
                   <a:srgbClr val="000000"/>
                 </a:solidFill>
@@ -1721,15 +1878,9 @@
               </a:rPr>
               <a:t>Third Outline Level</a:t>
             </a:r>
-            <a:endParaRPr b="0" lang="de-DE" sz="1800" spc="-1" strike="noStrike">
-              <a:solidFill>
-                <a:srgbClr val="000000"/>
-              </a:solidFill>
-              <a:latin typeface="Arial"/>
-            </a:endParaRPr>
-          </a:p>
-          <a:p>
-            <a:pPr lvl="3" marL="1728000" indent="-216000">
+          </a:p>
+          <a:p>
+            <a:pPr marL="1728000" lvl="3" indent="-216000">
               <a:spcBef>
                 <a:spcPts val="567"/>
               </a:spcBef>
@@ -1741,7 +1892,7 @@
               <a:buChar char=""/>
             </a:pPr>
             <a:r>
-              <a:rPr b="0" lang="de-DE" sz="1800" spc="-1" strike="noStrike">
+              <a:rPr lang="de-DE" sz="1800" b="0" strike="noStrike" spc="-1">
                 <a:solidFill>
                   <a:srgbClr val="000000"/>
                 </a:solidFill>
@@ -1749,15 +1900,9 @@
               </a:rPr>
               <a:t>Fourth Outline Level</a:t>
             </a:r>
-            <a:endParaRPr b="0" lang="de-DE" sz="1800" spc="-1" strike="noStrike">
-              <a:solidFill>
-                <a:srgbClr val="000000"/>
-              </a:solidFill>
-              <a:latin typeface="Arial"/>
-            </a:endParaRPr>
-          </a:p>
-          <a:p>
-            <a:pPr lvl="4" marL="2160000" indent="-216000">
+          </a:p>
+          <a:p>
+            <a:pPr marL="2160000" lvl="4" indent="-216000">
               <a:spcBef>
                 <a:spcPts val="283"/>
               </a:spcBef>
@@ -1769,7 +1914,7 @@
               <a:buChar char=""/>
             </a:pPr>
             <a:r>
-              <a:rPr b="0" lang="de-DE" sz="2000" spc="-1" strike="noStrike">
+              <a:rPr lang="de-DE" sz="2000" b="0" strike="noStrike" spc="-1">
                 <a:solidFill>
                   <a:srgbClr val="000000"/>
                 </a:solidFill>
@@ -1777,15 +1922,9 @@
               </a:rPr>
               <a:t>Fifth Outline Level</a:t>
             </a:r>
-            <a:endParaRPr b="0" lang="de-DE" sz="2000" spc="-1" strike="noStrike">
-              <a:solidFill>
-                <a:srgbClr val="000000"/>
-              </a:solidFill>
-              <a:latin typeface="Arial"/>
-            </a:endParaRPr>
-          </a:p>
-          <a:p>
-            <a:pPr lvl="5" marL="2592000" indent="-216000">
+          </a:p>
+          <a:p>
+            <a:pPr marL="2592000" lvl="5" indent="-216000">
               <a:spcBef>
                 <a:spcPts val="283"/>
               </a:spcBef>
@@ -1797,7 +1936,7 @@
               <a:buChar char=""/>
             </a:pPr>
             <a:r>
-              <a:rPr b="0" lang="de-DE" sz="2000" spc="-1" strike="noStrike">
+              <a:rPr lang="de-DE" sz="2000" b="0" strike="noStrike" spc="-1">
                 <a:solidFill>
                   <a:srgbClr val="000000"/>
                 </a:solidFill>
@@ -1805,15 +1944,9 @@
               </a:rPr>
               <a:t>Sixth Outline Level</a:t>
             </a:r>
-            <a:endParaRPr b="0" lang="de-DE" sz="2000" spc="-1" strike="noStrike">
-              <a:solidFill>
-                <a:srgbClr val="000000"/>
-              </a:solidFill>
-              <a:latin typeface="Arial"/>
-            </a:endParaRPr>
-          </a:p>
-          <a:p>
-            <a:pPr lvl="6" marL="3024000" indent="-216000">
+          </a:p>
+          <a:p>
+            <a:pPr marL="3024000" lvl="6" indent="-216000">
               <a:spcBef>
                 <a:spcPts val="283"/>
               </a:spcBef>
@@ -1825,7 +1958,7 @@
               <a:buChar char=""/>
             </a:pPr>
             <a:r>
-              <a:rPr b="0" lang="de-DE" sz="2000" spc="-1" strike="noStrike">
+              <a:rPr lang="de-DE" sz="2000" b="0" strike="noStrike" spc="-1">
                 <a:solidFill>
                   <a:srgbClr val="000000"/>
                 </a:solidFill>
@@ -1833,37 +1966,311 @@
               </a:rPr>
               <a:t>Seventh Outline Level</a:t>
             </a:r>
-            <a:endParaRPr b="0" lang="de-DE" sz="2000" spc="-1" strike="noStrike">
-              <a:solidFill>
-                <a:srgbClr val="000000"/>
-              </a:solidFill>
-              <a:latin typeface="Arial"/>
-            </a:endParaRPr>
           </a:p>
         </p:txBody>
       </p:sp>
     </p:spTree>
   </p:cSld>
-  <p:clrMap bg1="lt1" bg2="lt2" tx1="dk1" tx2="dk2" accent1="accent1" accent2="accent2" accent3="accent3" accent4="accent4" accent5="accent5" accent6="accent6" hlink="hlink" folHlink="folHlink"/>
+  <p:clrMap bg1="lt1" tx1="dk1" bg2="lt2" tx2="dk2" accent1="accent1" accent2="accent2" accent3="accent3" accent4="accent4" accent5="accent5" accent6="accent6" hlink="hlink" folHlink="folHlink"/>
   <p:sldLayoutIdLst>
-    <p:sldLayoutId id="2147483649" r:id="rId3"/>
-    <p:sldLayoutId id="2147483650" r:id="rId4"/>
-    <p:sldLayoutId id="2147483651" r:id="rId5"/>
-    <p:sldLayoutId id="2147483652" r:id="rId6"/>
-    <p:sldLayoutId id="2147483653" r:id="rId7"/>
-    <p:sldLayoutId id="2147483654" r:id="rId8"/>
-    <p:sldLayoutId id="2147483655" r:id="rId9"/>
-    <p:sldLayoutId id="2147483656" r:id="rId10"/>
-    <p:sldLayoutId id="2147483657" r:id="rId11"/>
-    <p:sldLayoutId id="2147483658" r:id="rId12"/>
-    <p:sldLayoutId id="2147483659" r:id="rId13"/>
-    <p:sldLayoutId id="2147483660" r:id="rId14"/>
+    <p:sldLayoutId id="2147483649" r:id="rId1"/>
+    <p:sldLayoutId id="2147483650" r:id="rId2"/>
+    <p:sldLayoutId id="2147483651" r:id="rId3"/>
+    <p:sldLayoutId id="2147483652" r:id="rId4"/>
+    <p:sldLayoutId id="2147483653" r:id="rId5"/>
+    <p:sldLayoutId id="2147483654" r:id="rId6"/>
+    <p:sldLayoutId id="2147483655" r:id="rId7"/>
+    <p:sldLayoutId id="2147483656" r:id="rId8"/>
+    <p:sldLayoutId id="2147483657" r:id="rId9"/>
+    <p:sldLayoutId id="2147483658" r:id="rId10"/>
+    <p:sldLayoutId id="2147483659" r:id="rId11"/>
+    <p:sldLayoutId id="2147483660" r:id="rId12"/>
   </p:sldLayoutIdLst>
+  <p:txStyles>
+    <p:titleStyle>
+      <a:lvl1pPr algn="l" defTabSz="914400" rtl="0" eaLnBrk="1" latinLnBrk="0" hangingPunct="1">
+        <a:lnSpc>
+          <a:spcPct val="90000"/>
+        </a:lnSpc>
+        <a:spcBef>
+          <a:spcPct val="0"/>
+        </a:spcBef>
+        <a:buNone/>
+        <a:defRPr sz="4400" kern="1200">
+          <a:solidFill>
+            <a:schemeClr val="tx1"/>
+          </a:solidFill>
+          <a:latin typeface="+mj-lt"/>
+          <a:ea typeface="+mj-ea"/>
+          <a:cs typeface="+mj-cs"/>
+        </a:defRPr>
+      </a:lvl1pPr>
+    </p:titleStyle>
+    <p:bodyStyle>
+      <a:lvl1pPr marL="228600" indent="-228600" algn="l" defTabSz="914400" rtl="0" eaLnBrk="1" latinLnBrk="0" hangingPunct="1">
+        <a:lnSpc>
+          <a:spcPct val="90000"/>
+        </a:lnSpc>
+        <a:spcBef>
+          <a:spcPts val="1000"/>
+        </a:spcBef>
+        <a:buFont typeface="Arial" panose="020B0604020202020204" pitchFamily="34" charset="0"/>
+        <a:buChar char="•"/>
+        <a:defRPr sz="2800" kern="1200">
+          <a:solidFill>
+            <a:schemeClr val="tx1"/>
+          </a:solidFill>
+          <a:latin typeface="+mn-lt"/>
+          <a:ea typeface="+mn-ea"/>
+          <a:cs typeface="+mn-cs"/>
+        </a:defRPr>
+      </a:lvl1pPr>
+      <a:lvl2pPr marL="685800" indent="-228600" algn="l" defTabSz="914400" rtl="0" eaLnBrk="1" latinLnBrk="0" hangingPunct="1">
+        <a:lnSpc>
+          <a:spcPct val="90000"/>
+        </a:lnSpc>
+        <a:spcBef>
+          <a:spcPts val="500"/>
+        </a:spcBef>
+        <a:buFont typeface="Arial" panose="020B0604020202020204" pitchFamily="34" charset="0"/>
+        <a:buChar char="•"/>
+        <a:defRPr sz="2400" kern="1200">
+          <a:solidFill>
+            <a:schemeClr val="tx1"/>
+          </a:solidFill>
+          <a:latin typeface="+mn-lt"/>
+          <a:ea typeface="+mn-ea"/>
+          <a:cs typeface="+mn-cs"/>
+        </a:defRPr>
+      </a:lvl2pPr>
+      <a:lvl3pPr marL="1143000" indent="-228600" algn="l" defTabSz="914400" rtl="0" eaLnBrk="1" latinLnBrk="0" hangingPunct="1">
+        <a:lnSpc>
+          <a:spcPct val="90000"/>
+        </a:lnSpc>
+        <a:spcBef>
+          <a:spcPts val="500"/>
+        </a:spcBef>
+        <a:buFont typeface="Arial" panose="020B0604020202020204" pitchFamily="34" charset="0"/>
+        <a:buChar char="•"/>
+        <a:defRPr sz="2000" kern="1200">
+          <a:solidFill>
+            <a:schemeClr val="tx1"/>
+          </a:solidFill>
+          <a:latin typeface="+mn-lt"/>
+          <a:ea typeface="+mn-ea"/>
+          <a:cs typeface="+mn-cs"/>
+        </a:defRPr>
+      </a:lvl3pPr>
+      <a:lvl4pPr marL="1600200" indent="-228600" algn="l" defTabSz="914400" rtl="0" eaLnBrk="1" latinLnBrk="0" hangingPunct="1">
+        <a:lnSpc>
+          <a:spcPct val="90000"/>
+        </a:lnSpc>
+        <a:spcBef>
+          <a:spcPts val="500"/>
+        </a:spcBef>
+        <a:buFont typeface="Arial" panose="020B0604020202020204" pitchFamily="34" charset="0"/>
+        <a:buChar char="•"/>
+        <a:defRPr sz="1800" kern="1200">
+          <a:solidFill>
+            <a:schemeClr val="tx1"/>
+          </a:solidFill>
+          <a:latin typeface="+mn-lt"/>
+          <a:ea typeface="+mn-ea"/>
+          <a:cs typeface="+mn-cs"/>
+        </a:defRPr>
+      </a:lvl4pPr>
+      <a:lvl5pPr marL="2057400" indent="-228600" algn="l" defTabSz="914400" rtl="0" eaLnBrk="1" latinLnBrk="0" hangingPunct="1">
+        <a:lnSpc>
+          <a:spcPct val="90000"/>
+        </a:lnSpc>
+        <a:spcBef>
+          <a:spcPts val="500"/>
+        </a:spcBef>
+        <a:buFont typeface="Arial" panose="020B0604020202020204" pitchFamily="34" charset="0"/>
+        <a:buChar char="•"/>
+        <a:defRPr sz="1800" kern="1200">
+          <a:solidFill>
+            <a:schemeClr val="tx1"/>
+          </a:solidFill>
+          <a:latin typeface="+mn-lt"/>
+          <a:ea typeface="+mn-ea"/>
+          <a:cs typeface="+mn-cs"/>
+        </a:defRPr>
+      </a:lvl5pPr>
+      <a:lvl6pPr marL="2514600" indent="-228600" algn="l" defTabSz="914400" rtl="0" eaLnBrk="1" latinLnBrk="0" hangingPunct="1">
+        <a:lnSpc>
+          <a:spcPct val="90000"/>
+        </a:lnSpc>
+        <a:spcBef>
+          <a:spcPts val="500"/>
+        </a:spcBef>
+        <a:buFont typeface="Arial" panose="020B0604020202020204" pitchFamily="34" charset="0"/>
+        <a:buChar char="•"/>
+        <a:defRPr sz="1800" kern="1200">
+          <a:solidFill>
+            <a:schemeClr val="tx1"/>
+          </a:solidFill>
+          <a:latin typeface="+mn-lt"/>
+          <a:ea typeface="+mn-ea"/>
+          <a:cs typeface="+mn-cs"/>
+        </a:defRPr>
+      </a:lvl6pPr>
+      <a:lvl7pPr marL="2971800" indent="-228600" algn="l" defTabSz="914400" rtl="0" eaLnBrk="1" latinLnBrk="0" hangingPunct="1">
+        <a:lnSpc>
+          <a:spcPct val="90000"/>
+        </a:lnSpc>
+        <a:spcBef>
+          <a:spcPts val="500"/>
+        </a:spcBef>
+        <a:buFont typeface="Arial" panose="020B0604020202020204" pitchFamily="34" charset="0"/>
+        <a:buChar char="•"/>
+        <a:defRPr sz="1800" kern="1200">
+          <a:solidFill>
+            <a:schemeClr val="tx1"/>
+          </a:solidFill>
+          <a:latin typeface="+mn-lt"/>
+          <a:ea typeface="+mn-ea"/>
+          <a:cs typeface="+mn-cs"/>
+        </a:defRPr>
+      </a:lvl7pPr>
+      <a:lvl8pPr marL="3429000" indent="-228600" algn="l" defTabSz="914400" rtl="0" eaLnBrk="1" latinLnBrk="0" hangingPunct="1">
+        <a:lnSpc>
+          <a:spcPct val="90000"/>
+        </a:lnSpc>
+        <a:spcBef>
+          <a:spcPts val="500"/>
+        </a:spcBef>
+        <a:buFont typeface="Arial" panose="020B0604020202020204" pitchFamily="34" charset="0"/>
+        <a:buChar char="•"/>
+        <a:defRPr sz="1800" kern="1200">
+          <a:solidFill>
+            <a:schemeClr val="tx1"/>
+          </a:solidFill>
+          <a:latin typeface="+mn-lt"/>
+          <a:ea typeface="+mn-ea"/>
+          <a:cs typeface="+mn-cs"/>
+        </a:defRPr>
+      </a:lvl8pPr>
+      <a:lvl9pPr marL="3886200" indent="-228600" algn="l" defTabSz="914400" rtl="0" eaLnBrk="1" latinLnBrk="0" hangingPunct="1">
+        <a:lnSpc>
+          <a:spcPct val="90000"/>
+        </a:lnSpc>
+        <a:spcBef>
+          <a:spcPts val="500"/>
+        </a:spcBef>
+        <a:buFont typeface="Arial" panose="020B0604020202020204" pitchFamily="34" charset="0"/>
+        <a:buChar char="•"/>
+        <a:defRPr sz="1800" kern="1200">
+          <a:solidFill>
+            <a:schemeClr val="tx1"/>
+          </a:solidFill>
+          <a:latin typeface="+mn-lt"/>
+          <a:ea typeface="+mn-ea"/>
+          <a:cs typeface="+mn-cs"/>
+        </a:defRPr>
+      </a:lvl9pPr>
+    </p:bodyStyle>
+    <p:otherStyle>
+      <a:defPPr>
+        <a:defRPr lang="de-DE"/>
+      </a:defPPr>
+      <a:lvl1pPr marL="0" algn="l" defTabSz="914400" rtl="0" eaLnBrk="1" latinLnBrk="0" hangingPunct="1">
+        <a:defRPr sz="1800" kern="1200">
+          <a:solidFill>
+            <a:schemeClr val="tx1"/>
+          </a:solidFill>
+          <a:latin typeface="+mn-lt"/>
+          <a:ea typeface="+mn-ea"/>
+          <a:cs typeface="+mn-cs"/>
+        </a:defRPr>
+      </a:lvl1pPr>
+      <a:lvl2pPr marL="457200" algn="l" defTabSz="914400" rtl="0" eaLnBrk="1" latinLnBrk="0" hangingPunct="1">
+        <a:defRPr sz="1800" kern="1200">
+          <a:solidFill>
+            <a:schemeClr val="tx1"/>
+          </a:solidFill>
+          <a:latin typeface="+mn-lt"/>
+          <a:ea typeface="+mn-ea"/>
+          <a:cs typeface="+mn-cs"/>
+        </a:defRPr>
+      </a:lvl2pPr>
+      <a:lvl3pPr marL="914400" algn="l" defTabSz="914400" rtl="0" eaLnBrk="1" latinLnBrk="0" hangingPunct="1">
+        <a:defRPr sz="1800" kern="1200">
+          <a:solidFill>
+            <a:schemeClr val="tx1"/>
+          </a:solidFill>
+          <a:latin typeface="+mn-lt"/>
+          <a:ea typeface="+mn-ea"/>
+          <a:cs typeface="+mn-cs"/>
+        </a:defRPr>
+      </a:lvl3pPr>
+      <a:lvl4pPr marL="1371600" algn="l" defTabSz="914400" rtl="0" eaLnBrk="1" latinLnBrk="0" hangingPunct="1">
+        <a:defRPr sz="1800" kern="1200">
+          <a:solidFill>
+            <a:schemeClr val="tx1"/>
+          </a:solidFill>
+          <a:latin typeface="+mn-lt"/>
+          <a:ea typeface="+mn-ea"/>
+          <a:cs typeface="+mn-cs"/>
+        </a:defRPr>
+      </a:lvl4pPr>
+      <a:lvl5pPr marL="1828800" algn="l" defTabSz="914400" rtl="0" eaLnBrk="1" latinLnBrk="0" hangingPunct="1">
+        <a:defRPr sz="1800" kern="1200">
+          <a:solidFill>
+            <a:schemeClr val="tx1"/>
+          </a:solidFill>
+          <a:latin typeface="+mn-lt"/>
+          <a:ea typeface="+mn-ea"/>
+          <a:cs typeface="+mn-cs"/>
+        </a:defRPr>
+      </a:lvl5pPr>
+      <a:lvl6pPr marL="2286000" algn="l" defTabSz="914400" rtl="0" eaLnBrk="1" latinLnBrk="0" hangingPunct="1">
+        <a:defRPr sz="1800" kern="1200">
+          <a:solidFill>
+            <a:schemeClr val="tx1"/>
+          </a:solidFill>
+          <a:latin typeface="+mn-lt"/>
+          <a:ea typeface="+mn-ea"/>
+          <a:cs typeface="+mn-cs"/>
+        </a:defRPr>
+      </a:lvl6pPr>
+      <a:lvl7pPr marL="2743200" algn="l" defTabSz="914400" rtl="0" eaLnBrk="1" latinLnBrk="0" hangingPunct="1">
+        <a:defRPr sz="1800" kern="1200">
+          <a:solidFill>
+            <a:schemeClr val="tx1"/>
+          </a:solidFill>
+          <a:latin typeface="+mn-lt"/>
+          <a:ea typeface="+mn-ea"/>
+          <a:cs typeface="+mn-cs"/>
+        </a:defRPr>
+      </a:lvl7pPr>
+      <a:lvl8pPr marL="3200400" algn="l" defTabSz="914400" rtl="0" eaLnBrk="1" latinLnBrk="0" hangingPunct="1">
+        <a:defRPr sz="1800" kern="1200">
+          <a:solidFill>
+            <a:schemeClr val="tx1"/>
+          </a:solidFill>
+          <a:latin typeface="+mn-lt"/>
+          <a:ea typeface="+mn-ea"/>
+          <a:cs typeface="+mn-cs"/>
+        </a:defRPr>
+      </a:lvl8pPr>
+      <a:lvl9pPr marL="3657600" algn="l" defTabSz="914400" rtl="0" eaLnBrk="1" latinLnBrk="0" hangingPunct="1">
+        <a:defRPr sz="1800" kern="1200">
+          <a:solidFill>
+            <a:schemeClr val="tx1"/>
+          </a:solidFill>
+          <a:latin typeface="+mn-lt"/>
+          <a:ea typeface="+mn-ea"/>
+          <a:cs typeface="+mn-cs"/>
+        </a:defRPr>
+      </a:lvl9pPr>
+    </p:otherStyle>
+  </p:txStyles>
 </p:sldMaster>
 </file>
 
 <file path=ppt/slides/slide1.xml><?xml version="1.0" encoding="utf-8"?>
-<p:sld xmlns:a="http://schemas.openxmlformats.org/drawingml/2006/main" xmlns:p="http://schemas.openxmlformats.org/presentationml/2006/main" xmlns:r="http://schemas.openxmlformats.org/officeDocument/2006/relationships" xmlns:p14="http://schemas.microsoft.com/office/powerpoint/2010/main" xmlns:p15="http://schemas.microsoft.com/office/powerpoint/2012/main" xmlns:mc="http://schemas.openxmlformats.org/markup-compatibility/2006">
+<p:sld xmlns:a="http://schemas.openxmlformats.org/drawingml/2006/main" xmlns:r="http://schemas.openxmlformats.org/officeDocument/2006/relationships" xmlns:p="http://schemas.openxmlformats.org/presentationml/2006/main">
   <p:cSld>
     <p:spTree>
       <p:nvGrpSpPr>
@@ -1938,15 +2345,22 @@
           </a:ln>
         </p:spPr>
         <p:style>
-          <a:lnRef idx="0"/>
-          <a:fillRef idx="0"/>
-          <a:effectRef idx="0"/>
+          <a:lnRef idx="0">
+            <a:scrgbClr r="0" g="0" b="0"/>
+          </a:lnRef>
+          <a:fillRef idx="0">
+            <a:scrgbClr r="0" g="0" b="0"/>
+          </a:fillRef>
+          <a:effectRef idx="0">
+            <a:scrgbClr r="0" g="0" b="0"/>
+          </a:effectRef>
           <a:fontRef idx="minor"/>
         </p:style>
         <p:txBody>
-          <a:bodyPr lIns="129240" rIns="129240" tIns="64800" bIns="64800">
+          <a:bodyPr lIns="129240" tIns="64800" rIns="129240" bIns="64800">
             <a:noAutofit/>
           </a:bodyPr>
+          <a:lstStyle/>
           <a:p>
             <a:pPr>
               <a:lnSpc>
@@ -1957,9 +2371,9 @@
               </a:spcBef>
             </a:pPr>
             <a:r>
-              <a:rPr b="0" lang="de-DE" sz="3200" spc="-1" strike="noStrike">
-                <a:solidFill>
-                  <a:srgbClr val="3e444c"/>
+              <a:rPr lang="de-DE" sz="3200" b="0" strike="noStrike" spc="-1">
+                <a:solidFill>
+                  <a:srgbClr val="3E444C"/>
                 </a:solidFill>
                 <a:latin typeface="Univers for UniS 55 Roman Rg"/>
                 <a:ea typeface="DejaVu Sans"/>
@@ -1968,16 +2382,16 @@
             </a:r>
             <a:br/>
             <a:r>
-              <a:rPr b="0" lang="de-DE" sz="3200" spc="-1" strike="noStrike">
-                <a:solidFill>
-                  <a:srgbClr val="3e444c"/>
+              <a:rPr lang="de-DE" sz="3200" b="0" strike="noStrike" spc="-1">
+                <a:solidFill>
+                  <a:srgbClr val="3E444C"/>
                 </a:solidFill>
                 <a:latin typeface="Univers for UniS 55 Roman Rg"/>
                 <a:ea typeface="DejaVu Sans"/>
               </a:rPr>
               <a:t>Betreuer: Florian Barth M. Sc., Dipl-Inf. Filip Krumpe, Dipl-Inf. Thomas Mendel</a:t>
             </a:r>
-            <a:endParaRPr b="0" lang="de-DE" sz="3200" spc="-1" strike="noStrike">
+            <a:endParaRPr lang="de-DE" sz="3200" b="0" strike="noStrike" spc="-1">
               <a:latin typeface="Arial"/>
             </a:endParaRPr>
           </a:p>
@@ -2003,15 +2417,22 @@
           </a:ln>
         </p:spPr>
         <p:style>
-          <a:lnRef idx="0"/>
-          <a:fillRef idx="0"/>
-          <a:effectRef idx="0"/>
+          <a:lnRef idx="0">
+            <a:scrgbClr r="0" g="0" b="0"/>
+          </a:lnRef>
+          <a:fillRef idx="0">
+            <a:scrgbClr r="0" g="0" b="0"/>
+          </a:fillRef>
+          <a:effectRef idx="0">
+            <a:scrgbClr r="0" g="0" b="0"/>
+          </a:effectRef>
           <a:fontRef idx="minor"/>
         </p:style>
         <p:txBody>
-          <a:bodyPr lIns="129240" rIns="129240" tIns="64800" bIns="64800">
+          <a:bodyPr lIns="129240" tIns="64800" rIns="129240" bIns="64800">
             <a:noAutofit/>
           </a:bodyPr>
+          <a:lstStyle/>
           <a:p>
             <a:pPr>
               <a:lnSpc>
@@ -2022,16 +2443,16 @@
               </a:spcBef>
             </a:pPr>
             <a:r>
-              <a:rPr b="0" lang="de-DE" sz="5200" spc="-1" strike="noStrike">
-                <a:solidFill>
-                  <a:srgbClr val="ffffff"/>
+              <a:rPr lang="de-DE" sz="5200" b="0" strike="noStrike" spc="-1">
+                <a:solidFill>
+                  <a:srgbClr val="FFFFFF"/>
                 </a:solidFill>
                 <a:latin typeface="Univers for UniS 65 Bold Rg"/>
                 <a:ea typeface="DejaVu Sans"/>
               </a:rPr>
               <a:t>Institut für </a:t>
             </a:r>
-            <a:endParaRPr b="0" lang="de-DE" sz="5200" spc="-1" strike="noStrike">
+            <a:endParaRPr lang="de-DE" sz="5200" b="0" strike="noStrike" spc="-1">
               <a:latin typeface="Arial"/>
             </a:endParaRPr>
           </a:p>
@@ -2045,16 +2466,16 @@
               </a:spcBef>
             </a:pPr>
             <a:r>
-              <a:rPr b="0" lang="de-DE" sz="5200" spc="-1" strike="noStrike">
-                <a:solidFill>
-                  <a:srgbClr val="ffffff"/>
+              <a:rPr lang="de-DE" sz="5200" b="0" strike="noStrike" spc="-1">
+                <a:solidFill>
+                  <a:srgbClr val="FFFFFF"/>
                 </a:solidFill>
                 <a:latin typeface="Univers for UniS 65 Bold Rg"/>
                 <a:ea typeface="DejaVu Sans"/>
               </a:rPr>
               <a:t>Formale Methoden der Informatik (FMI)</a:t>
             </a:r>
-            <a:endParaRPr b="0" lang="de-DE" sz="5200" spc="-1" strike="noStrike">
+            <a:endParaRPr lang="de-DE" sz="5200" b="0" strike="noStrike" spc="-1">
               <a:latin typeface="Arial"/>
             </a:endParaRPr>
           </a:p>
@@ -2080,15 +2501,22 @@
           </a:ln>
         </p:spPr>
         <p:style>
-          <a:lnRef idx="0"/>
-          <a:fillRef idx="0"/>
-          <a:effectRef idx="0"/>
+          <a:lnRef idx="0">
+            <a:scrgbClr r="0" g="0" b="0"/>
+          </a:lnRef>
+          <a:fillRef idx="0">
+            <a:scrgbClr r="0" g="0" b="0"/>
+          </a:fillRef>
+          <a:effectRef idx="0">
+            <a:scrgbClr r="0" g="0" b="0"/>
+          </a:effectRef>
           <a:fontRef idx="minor"/>
         </p:style>
         <p:txBody>
-          <a:bodyPr lIns="129240" rIns="129240" tIns="64800" bIns="64800">
+          <a:bodyPr lIns="129240" tIns="64800" rIns="129240" bIns="64800">
             <a:noAutofit/>
           </a:bodyPr>
+          <a:lstStyle/>
           <a:p>
             <a:pPr>
               <a:lnSpc>
@@ -2099,9 +2527,9 @@
               </a:spcBef>
             </a:pPr>
             <a:r>
-              <a:rPr b="0" lang="de-DE" sz="9120" spc="-1" strike="noStrike">
-                <a:solidFill>
-                  <a:srgbClr val="7f7f7f"/>
+              <a:rPr lang="de-DE" sz="9120" b="0" strike="noStrike" spc="-1">
+                <a:solidFill>
+                  <a:srgbClr val="7F7F7F"/>
                 </a:solidFill>
                 <a:latin typeface="Calibri"/>
                 <a:ea typeface="DejaVu Sans"/>
@@ -2110,16 +2538,16 @@
             </a:r>
             <a:br/>
             <a:r>
-              <a:rPr b="0" lang="de-DE" sz="9120" spc="-1" strike="noStrike">
-                <a:solidFill>
-                  <a:srgbClr val="7f7f7f"/>
+              <a:rPr lang="de-DE" sz="9120" b="0" strike="noStrike" spc="-1">
+                <a:solidFill>
+                  <a:srgbClr val="7F7F7F"/>
                 </a:solidFill>
                 <a:latin typeface="Calibri"/>
                 <a:ea typeface="DejaVu Sans"/>
               </a:rPr>
               <a:t>Area Label Fitting in OSM</a:t>
             </a:r>
-            <a:endParaRPr b="0" lang="de-DE" sz="9120" spc="-1" strike="noStrike">
+            <a:endParaRPr lang="de-DE" sz="9120" b="0" strike="noStrike" spc="-1">
               <a:latin typeface="Arial"/>
             </a:endParaRPr>
           </a:p>
@@ -2140,13 +2568,13 @@
             <a:avLst/>
           </a:prstGeom>
           <a:solidFill>
-            <a:srgbClr val="00b0f0"/>
+            <a:srgbClr val="00B0F0"/>
           </a:solidFill>
           <a:ln>
             <a:noFill/>
           </a:ln>
           <a:effectLst>
-            <a:outerShdw algn="tl" blurRad="50800" dir="2700000" dist="37674" rotWithShape="0">
+            <a:outerShdw blurRad="50800" dist="37674" dir="2700000" algn="tl" rotWithShape="0">
               <a:srgbClr val="000000">
                 <a:alpha val="40000"/>
               </a:srgbClr>
@@ -2154,15 +2582,22 @@
           </a:effectLst>
         </p:spPr>
         <p:style>
-          <a:lnRef idx="0"/>
-          <a:fillRef idx="0"/>
-          <a:effectRef idx="0"/>
+          <a:lnRef idx="0">
+            <a:scrgbClr r="0" g="0" b="0"/>
+          </a:lnRef>
+          <a:fillRef idx="0">
+            <a:scrgbClr r="0" g="0" b="0"/>
+          </a:fillRef>
+          <a:effectRef idx="0">
+            <a:scrgbClr r="0" g="0" b="0"/>
+          </a:effectRef>
           <a:fontRef idx="minor"/>
         </p:style>
         <p:txBody>
-          <a:bodyPr lIns="129240" rIns="129240" tIns="64800" bIns="64800">
+          <a:bodyPr lIns="129240" tIns="64800" rIns="129240" bIns="64800">
             <a:noAutofit/>
           </a:bodyPr>
+          <a:lstStyle/>
           <a:p>
             <a:pPr>
               <a:lnSpc>
@@ -2170,26 +2605,16 @@
               </a:lnSpc>
             </a:pPr>
             <a:r>
-              <a:rPr b="0" lang="de-DE" sz="2800" spc="-1" strike="noStrike">
-                <a:solidFill>
-                  <a:srgbClr val="ffffff"/>
-                </a:solidFill>
-                <a:latin typeface="Arial"/>
-                <a:ea typeface="DejaVu Sans"/>
-              </a:rPr>
-              <a:t>                                                 </a:t>
-            </a:r>
-            <a:r>
-              <a:rPr b="0" lang="de-DE" sz="2800" spc="-1" strike="noStrike">
-                <a:solidFill>
-                  <a:srgbClr val="ffffff"/>
-                </a:solidFill>
-                <a:latin typeface="Arial"/>
-                <a:ea typeface="DejaVu Sans"/>
-              </a:rPr>
-              <a:t>Problemstellung</a:t>
-            </a:r>
-            <a:endParaRPr b="0" lang="de-DE" sz="2800" spc="-1" strike="noStrike">
+              <a:rPr lang="de-DE" sz="2800" b="0" strike="noStrike" spc="-1">
+                <a:solidFill>
+                  <a:srgbClr val="FFFFFF"/>
+                </a:solidFill>
+                <a:latin typeface="Arial"/>
+                <a:ea typeface="DejaVu Sans"/>
+              </a:rPr>
+              <a:t>                                                 Problemstellung</a:t>
+            </a:r>
+            <a:endParaRPr lang="de-DE" sz="2800" b="0" strike="noStrike" spc="-1">
               <a:latin typeface="Arial"/>
             </a:endParaRPr>
           </a:p>
@@ -2199,7 +2624,7 @@
                 <a:spcPct val="100000"/>
               </a:lnSpc>
             </a:pPr>
-            <a:endParaRPr b="0" lang="de-DE" sz="2800" spc="-1" strike="noStrike">
+            <a:endParaRPr lang="de-DE" sz="2800" b="0" strike="noStrike" spc="-1">
               <a:latin typeface="Arial"/>
             </a:endParaRPr>
           </a:p>
@@ -2225,15 +2650,22 @@
           </a:ln>
         </p:spPr>
         <p:style>
-          <a:lnRef idx="0"/>
-          <a:fillRef idx="0"/>
-          <a:effectRef idx="0"/>
+          <a:lnRef idx="0">
+            <a:scrgbClr r="0" g="0" b="0"/>
+          </a:lnRef>
+          <a:fillRef idx="0">
+            <a:scrgbClr r="0" g="0" b="0"/>
+          </a:fillRef>
+          <a:effectRef idx="0">
+            <a:scrgbClr r="0" g="0" b="0"/>
+          </a:effectRef>
           <a:fontRef idx="minor"/>
         </p:style>
         <p:txBody>
-          <a:bodyPr lIns="129240" rIns="129240" tIns="64800" bIns="64800">
+          <a:bodyPr lIns="129240" tIns="64800" rIns="129240" bIns="64800">
             <a:noAutofit/>
           </a:bodyPr>
+          <a:lstStyle/>
           <a:p>
             <a:pPr marL="108360">
               <a:lnSpc>
@@ -2244,9 +2676,9 @@
               </a:spcBef>
             </a:pPr>
             <a:r>
-              <a:rPr b="0" lang="de-DE" sz="3200" spc="-1" strike="noStrike">
-                <a:solidFill>
-                  <a:srgbClr val="ffffff"/>
+              <a:rPr lang="de-DE" sz="3200" b="0" strike="noStrike" spc="-1">
+                <a:solidFill>
+                  <a:srgbClr val="FFFFFF"/>
                 </a:solidFill>
                 <a:latin typeface="Calibri"/>
                 <a:ea typeface="DejaVu Sans"/>
@@ -2255,9 +2687,9 @@
             </a:r>
             <a:br/>
             <a:r>
-              <a:rPr b="0" lang="de-DE" sz="3200" spc="-1" strike="noStrike">
-                <a:solidFill>
-                  <a:srgbClr val="ffffff"/>
+              <a:rPr lang="de-DE" sz="3200" b="0" strike="noStrike" spc="-1">
+                <a:solidFill>
+                  <a:srgbClr val="FFFFFF"/>
                 </a:solidFill>
                 <a:latin typeface="Calibri"/>
                 <a:ea typeface="DejaVu Sans"/>
@@ -2266,9 +2698,9 @@
             </a:r>
             <a:br/>
             <a:r>
-              <a:rPr b="0" lang="de-DE" sz="3200" spc="-1" strike="noStrike">
-                <a:solidFill>
-                  <a:srgbClr val="ffffff"/>
+              <a:rPr lang="de-DE" sz="3200" b="0" strike="noStrike" spc="-1">
+                <a:solidFill>
+                  <a:srgbClr val="FFFFFF"/>
                 </a:solidFill>
                 <a:latin typeface="Calibri"/>
                 <a:ea typeface="DejaVu Sans"/>
@@ -2277,16 +2709,16 @@
             </a:r>
             <a:br/>
             <a:r>
-              <a:rPr b="0" lang="de-DE" sz="3200" spc="-1" strike="noStrike">
-                <a:solidFill>
-                  <a:srgbClr val="ffffff"/>
+              <a:rPr lang="de-DE" sz="3200" b="0" strike="noStrike" spc="-1">
+                <a:solidFill>
+                  <a:srgbClr val="FFFFFF"/>
                 </a:solidFill>
                 <a:latin typeface="Calibri"/>
                 <a:ea typeface="DejaVu Sans"/>
               </a:rPr>
               <a:t>Michel Weitbrecht</a:t>
             </a:r>
-            <a:endParaRPr b="0" lang="de-DE" sz="3200" spc="-1" strike="noStrike">
+            <a:endParaRPr lang="de-DE" sz="3200" b="0" strike="noStrike" spc="-1">
               <a:latin typeface="Arial"/>
             </a:endParaRPr>
           </a:p>
@@ -2294,12 +2726,12 @@
       </p:sp>
       <p:pic>
         <p:nvPicPr>
-          <p:cNvPr id="47" name="Grafik 126" descr=""/>
+          <p:cNvPr id="47" name="Grafik 126"/>
           <p:cNvPicPr/>
           <p:nvPr/>
         </p:nvPicPr>
         <p:blipFill>
-          <a:blip r:embed="rId1"/>
+          <a:blip r:embed="rId2"/>
           <a:stretch/>
         </p:blipFill>
         <p:spPr>
@@ -2338,9 +2770,15 @@
           </a:ln>
         </p:spPr>
         <p:style>
-          <a:lnRef idx="0"/>
-          <a:fillRef idx="0"/>
-          <a:effectRef idx="0"/>
+          <a:lnRef idx="0">
+            <a:scrgbClr r="0" g="0" b="0"/>
+          </a:lnRef>
+          <a:fillRef idx="0">
+            <a:scrgbClr r="0" g="0" b="0"/>
+          </a:fillRef>
+          <a:effectRef idx="0">
+            <a:scrgbClr r="0" g="0" b="0"/>
+          </a:effectRef>
           <a:fontRef idx="minor"/>
         </p:style>
       </p:sp>
@@ -2359,13 +2797,13 @@
             <a:avLst/>
           </a:prstGeom>
           <a:solidFill>
-            <a:srgbClr val="00b0f0"/>
+            <a:srgbClr val="00B0F0"/>
           </a:solidFill>
           <a:ln>
             <a:noFill/>
           </a:ln>
           <a:effectLst>
-            <a:outerShdw algn="tl" blurRad="50800" dir="2700000" dist="37674" rotWithShape="0">
+            <a:outerShdw blurRad="50800" dist="37674" dir="2700000" algn="tl" rotWithShape="0">
               <a:srgbClr val="000000">
                 <a:alpha val="40000"/>
               </a:srgbClr>
@@ -2373,15 +2811,22 @@
           </a:effectLst>
         </p:spPr>
         <p:style>
-          <a:lnRef idx="0"/>
-          <a:fillRef idx="0"/>
-          <a:effectRef idx="0"/>
+          <a:lnRef idx="0">
+            <a:scrgbClr r="0" g="0" b="0"/>
+          </a:lnRef>
+          <a:fillRef idx="0">
+            <a:scrgbClr r="0" g="0" b="0"/>
+          </a:fillRef>
+          <a:effectRef idx="0">
+            <a:scrgbClr r="0" g="0" b="0"/>
+          </a:effectRef>
           <a:fontRef idx="minor"/>
         </p:style>
         <p:txBody>
-          <a:bodyPr lIns="129240" rIns="129240" tIns="64800" bIns="64800">
+          <a:bodyPr lIns="129240" tIns="64800" rIns="129240" bIns="64800">
             <a:noAutofit/>
           </a:bodyPr>
+          <a:lstStyle/>
           <a:p>
             <a:pPr>
               <a:lnSpc>
@@ -2389,26 +2834,16 @@
               </a:lnSpc>
             </a:pPr>
             <a:r>
-              <a:rPr b="0" lang="de-DE" sz="2800" spc="-1" strike="noStrike">
-                <a:solidFill>
-                  <a:srgbClr val="ffffff"/>
-                </a:solidFill>
-                <a:latin typeface="Arial"/>
-                <a:ea typeface="DejaVu Sans"/>
-              </a:rPr>
-              <a:t>                                                     </a:t>
-            </a:r>
-            <a:r>
-              <a:rPr b="0" lang="de-DE" sz="2800" spc="-1" strike="noStrike">
-                <a:solidFill>
-                  <a:srgbClr val="ffffff"/>
-                </a:solidFill>
-                <a:latin typeface="Arial"/>
-                <a:ea typeface="DejaVu Sans"/>
-              </a:rPr>
-              <a:t>Architektur</a:t>
-            </a:r>
-            <a:endParaRPr b="0" lang="de-DE" sz="2800" spc="-1" strike="noStrike">
+              <a:rPr lang="de-DE" sz="2800" b="0" strike="noStrike" spc="-1">
+                <a:solidFill>
+                  <a:srgbClr val="FFFFFF"/>
+                </a:solidFill>
+                <a:latin typeface="Arial"/>
+                <a:ea typeface="DejaVu Sans"/>
+              </a:rPr>
+              <a:t>                                                     Architektur</a:t>
+            </a:r>
+            <a:endParaRPr lang="de-DE" sz="2800" b="0" strike="noStrike" spc="-1">
               <a:latin typeface="Arial"/>
             </a:endParaRPr>
           </a:p>
@@ -2418,7 +2853,7 @@
                 <a:spcPct val="100000"/>
               </a:lnSpc>
             </a:pPr>
-            <a:endParaRPr b="0" lang="de-DE" sz="2800" spc="-1" strike="noStrike">
+            <a:endParaRPr lang="de-DE" sz="2800" b="0" strike="noStrike" spc="-1">
               <a:latin typeface="Arial"/>
             </a:endParaRPr>
           </a:p>
@@ -2455,16 +2890,17 @@
           <a:fontRef idx="minor"/>
         </p:style>
         <p:txBody>
-          <a:bodyPr lIns="90000" rIns="90000" tIns="45000" bIns="45000" anchor="ctr">
+          <a:bodyPr lIns="90000" tIns="45000" rIns="90000" bIns="45000" anchor="ctr">
             <a:noAutofit/>
           </a:bodyPr>
+          <a:lstStyle/>
           <a:p>
             <a:pPr>
               <a:lnSpc>
                 <a:spcPct val="100000"/>
               </a:lnSpc>
             </a:pPr>
-            <a:endParaRPr b="0" lang="de-DE" sz="1800" spc="-1" strike="noStrike">
+            <a:endParaRPr lang="de-DE" sz="1800" b="0" strike="noStrike" spc="-1">
               <a:latin typeface="Arial"/>
             </a:endParaRPr>
           </a:p>
@@ -2474,7 +2910,7 @@
                 <a:spcPct val="100000"/>
               </a:lnSpc>
             </a:pPr>
-            <a:endParaRPr b="0" lang="de-DE" sz="1800" spc="-1" strike="noStrike">
+            <a:endParaRPr lang="de-DE" sz="1800" b="0" strike="noStrike" spc="-1">
               <a:latin typeface="Arial"/>
             </a:endParaRPr>
           </a:p>
@@ -2484,7 +2920,7 @@
                 <a:spcPct val="100000"/>
               </a:lnSpc>
             </a:pPr>
-            <a:endParaRPr b="0" lang="de-DE" sz="1800" spc="-1" strike="noStrike">
+            <a:endParaRPr lang="de-DE" sz="1800" b="0" strike="noStrike" spc="-1">
               <a:latin typeface="Arial"/>
             </a:endParaRPr>
           </a:p>
@@ -2494,7 +2930,7 @@
                 <a:spcPct val="100000"/>
               </a:lnSpc>
             </a:pPr>
-            <a:endParaRPr b="0" lang="de-DE" sz="1800" spc="-1" strike="noStrike">
+            <a:endParaRPr lang="de-DE" sz="1800" b="0" strike="noStrike" spc="-1">
               <a:latin typeface="Arial"/>
             </a:endParaRPr>
           </a:p>
@@ -2504,7 +2940,7 @@
                 <a:spcPct val="100000"/>
               </a:lnSpc>
             </a:pPr>
-            <a:endParaRPr b="0" lang="de-DE" sz="1800" spc="-1" strike="noStrike">
+            <a:endParaRPr lang="de-DE" sz="1800" b="0" strike="noStrike" spc="-1">
               <a:latin typeface="Arial"/>
             </a:endParaRPr>
           </a:p>
@@ -2514,7 +2950,7 @@
                 <a:spcPct val="100000"/>
               </a:lnSpc>
             </a:pPr>
-            <a:endParaRPr b="0" lang="de-DE" sz="1800" spc="-1" strike="noStrike">
+            <a:endParaRPr lang="de-DE" sz="1800" b="0" strike="noStrike" spc="-1">
               <a:latin typeface="Arial"/>
             </a:endParaRPr>
           </a:p>
@@ -2524,7 +2960,7 @@
                 <a:spcPct val="100000"/>
               </a:lnSpc>
             </a:pPr>
-            <a:endParaRPr b="0" lang="de-DE" sz="1800" spc="-1" strike="noStrike">
+            <a:endParaRPr lang="de-DE" sz="1800" b="0" strike="noStrike" spc="-1">
               <a:latin typeface="Arial"/>
             </a:endParaRPr>
           </a:p>
@@ -2534,7 +2970,7 @@
                 <a:spcPct val="100000"/>
               </a:lnSpc>
             </a:pPr>
-            <a:endParaRPr b="0" lang="de-DE" sz="1800" spc="-1" strike="noStrike">
+            <a:endParaRPr lang="de-DE" sz="1800" b="0" strike="noStrike" spc="-1">
               <a:latin typeface="Arial"/>
             </a:endParaRPr>
           </a:p>
@@ -2544,7 +2980,7 @@
                 <a:spcPct val="100000"/>
               </a:lnSpc>
             </a:pPr>
-            <a:endParaRPr b="0" lang="de-DE" sz="1800" spc="-1" strike="noStrike">
+            <a:endParaRPr lang="de-DE" sz="1800" b="0" strike="noStrike" spc="-1">
               <a:latin typeface="Arial"/>
             </a:endParaRPr>
           </a:p>
@@ -2554,7 +2990,7 @@
                 <a:spcPct val="100000"/>
               </a:lnSpc>
             </a:pPr>
-            <a:endParaRPr b="0" lang="de-DE" sz="1800" spc="-1" strike="noStrike">
+            <a:endParaRPr lang="de-DE" sz="1800" b="0" strike="noStrike" spc="-1">
               <a:latin typeface="Arial"/>
             </a:endParaRPr>
           </a:p>
@@ -2564,7 +3000,7 @@
                 <a:spcPct val="100000"/>
               </a:lnSpc>
             </a:pPr>
-            <a:endParaRPr b="0" lang="de-DE" sz="1800" spc="-1" strike="noStrike">
+            <a:endParaRPr lang="de-DE" sz="1800" b="0" strike="noStrike" spc="-1">
               <a:latin typeface="Arial"/>
             </a:endParaRPr>
           </a:p>
@@ -2572,30 +3008,7 @@
       </p:sp>
       <p:pic>
         <p:nvPicPr>
-          <p:cNvPr id="51" name="Grafik 2" descr=""/>
-          <p:cNvPicPr/>
-          <p:nvPr/>
-        </p:nvPicPr>
-        <p:blipFill>
-          <a:blip r:embed="rId2"/>
-          <a:stretch/>
-        </p:blipFill>
-        <p:spPr>
-          <a:xfrm>
-            <a:off x="2523240" y="25316640"/>
-            <a:ext cx="12008160" cy="5994720"/>
-          </a:xfrm>
-          <a:prstGeom prst="rect">
-            <a:avLst/>
-          </a:prstGeom>
-          <a:ln>
-            <a:noFill/>
-          </a:ln>
-        </p:spPr>
-      </p:pic>
-      <p:pic>
-        <p:nvPicPr>
-          <p:cNvPr id="52" name="Grafik 13" descr=""/>
+          <p:cNvPr id="51" name="Grafik 2"/>
           <p:cNvPicPr/>
           <p:nvPr/>
         </p:nvPicPr>
@@ -2605,8 +3018,32 @@
         </p:blipFill>
         <p:spPr>
           <a:xfrm>
-            <a:off x="2507400" y="17909280"/>
-            <a:ext cx="6124320" cy="5362560"/>
+            <a:off x="2523240" y="25316640"/>
+            <a:ext cx="12008160" cy="5994720"/>
+          </a:xfrm>
+          <a:prstGeom prst="rect">
+            <a:avLst/>
+          </a:prstGeom>
+          <a:ln>
+            <a:noFill/>
+          </a:ln>
+        </p:spPr>
+      </p:pic>
+      <p:pic>
+        <p:nvPicPr>
+          <p:cNvPr id="52" name="Grafik 13"/>
+          <p:cNvPicPr/>
+          <p:nvPr/>
+        </p:nvPicPr>
+        <p:blipFill rotWithShape="1">
+          <a:blip r:embed="rId4"/>
+          <a:srcRect t="5089"/>
+          <a:stretch/>
+        </p:blipFill>
+        <p:spPr>
+          <a:xfrm>
+            <a:off x="2507400" y="18182160"/>
+            <a:ext cx="6124320" cy="5089680"/>
           </a:xfrm>
           <a:prstGeom prst="rect">
             <a:avLst/>
@@ -2636,15 +3073,22 @@
           </a:ln>
         </p:spPr>
         <p:style>
-          <a:lnRef idx="0"/>
-          <a:fillRef idx="0"/>
-          <a:effectRef idx="0"/>
+          <a:lnRef idx="0">
+            <a:scrgbClr r="0" g="0" b="0"/>
+          </a:lnRef>
+          <a:fillRef idx="0">
+            <a:scrgbClr r="0" g="0" b="0"/>
+          </a:fillRef>
+          <a:effectRef idx="0">
+            <a:scrgbClr r="0" g="0" b="0"/>
+          </a:effectRef>
           <a:fontRef idx="minor"/>
         </p:style>
         <p:txBody>
-          <a:bodyPr lIns="90000" rIns="90000" tIns="45000" bIns="45000">
+          <a:bodyPr lIns="90000" tIns="45000" rIns="90000" bIns="45000">
             <a:spAutoFit/>
           </a:bodyPr>
+          <a:lstStyle/>
           <a:p>
             <a:pPr>
               <a:lnSpc>
@@ -2652,16 +3096,26 @@
               </a:lnSpc>
             </a:pPr>
             <a:r>
-              <a:rPr b="0" lang="de-DE" sz="2400" spc="-1" strike="noStrike">
-                <a:solidFill>
-                  <a:srgbClr val="000000"/>
-                </a:solidFill>
-                <a:latin typeface="Arial"/>
-                <a:ea typeface="DejaVu Sans"/>
-              </a:rPr>
-              <a:t>Herkömmliche Kartensysteme laden ihre Daten in Form vor-gerendeten</a:t>
-            </a:r>
-            <a:endParaRPr b="0" lang="de-DE" sz="2400" spc="-1" strike="noStrike">
+              <a:rPr lang="de-DE" sz="2400" b="0" strike="noStrike" spc="-1" dirty="0">
+                <a:solidFill>
+                  <a:srgbClr val="000000"/>
+                </a:solidFill>
+                <a:latin typeface="Arial"/>
+                <a:ea typeface="DejaVu Sans"/>
+              </a:rPr>
+              <a:t>Herkömmliche Kartensysteme laden ihre Daten in Form vor-</a:t>
+            </a:r>
+            <a:r>
+              <a:rPr lang="de-DE" sz="2400" b="0" strike="noStrike" spc="-1">
+                <a:solidFill>
+                  <a:srgbClr val="000000"/>
+                </a:solidFill>
+                <a:latin typeface="Arial"/>
+                <a:ea typeface="DejaVu Sans"/>
+              </a:rPr>
+              <a:t>gerendeter</a:t>
+            </a:r>
+            <a:endParaRPr lang="de-DE" sz="2400" b="0" strike="noStrike" spc="-1" dirty="0">
               <a:latin typeface="Arial"/>
             </a:endParaRPr>
           </a:p>
@@ -2672,16 +3126,36 @@
               </a:lnSpc>
             </a:pPr>
             <a:r>
-              <a:rPr b="0" lang="de-DE" sz="2400" spc="-1" strike="noStrike">
-                <a:solidFill>
-                  <a:srgbClr val="000000"/>
-                </a:solidFill>
-                <a:latin typeface="Arial"/>
-                <a:ea typeface="DejaVu Sans"/>
-              </a:rPr>
-              <a:t>Grafiken (Tiles).</a:t>
-            </a:r>
-            <a:endParaRPr b="0" lang="de-DE" sz="2400" spc="-1" strike="noStrike">
+              <a:rPr lang="de-DE" sz="2400" b="0" strike="noStrike" spc="-1" dirty="0">
+                <a:solidFill>
+                  <a:srgbClr val="000000"/>
+                </a:solidFill>
+                <a:latin typeface="Arial"/>
+                <a:ea typeface="DejaVu Sans"/>
+              </a:rPr>
+              <a:t>Grafiken (</a:t>
+            </a:r>
+            <a:r>
+              <a:rPr lang="de-DE" sz="2400" b="0" strike="noStrike" spc="-1" dirty="0" err="1">
+                <a:solidFill>
+                  <a:srgbClr val="000000"/>
+                </a:solidFill>
+                <a:latin typeface="Arial"/>
+                <a:ea typeface="DejaVu Sans"/>
+              </a:rPr>
+              <a:t>Tiles</a:t>
+            </a:r>
+            <a:r>
+              <a:rPr lang="de-DE" sz="2400" b="0" strike="noStrike" spc="-1" dirty="0">
+                <a:solidFill>
+                  <a:srgbClr val="000000"/>
+                </a:solidFill>
+                <a:latin typeface="Arial"/>
+                <a:ea typeface="DejaVu Sans"/>
+              </a:rPr>
+              <a:t>).</a:t>
+            </a:r>
+            <a:endParaRPr lang="de-DE" sz="2400" b="0" strike="noStrike" spc="-1" dirty="0">
               <a:latin typeface="Arial"/>
             </a:endParaRPr>
           </a:p>
@@ -2691,9 +3165,11 @@
                 <a:spcPct val="100000"/>
               </a:lnSpc>
             </a:pPr>
-            <a:br/>
-            <a:r>
-              <a:rPr b="0" i="1" lang="de-DE" sz="2400" spc="-1" strike="noStrike">
+            <a:br>
+              <a:rPr dirty="0"/>
+            </a:br>
+            <a:r>
+              <a:rPr lang="de-DE" sz="2400" b="0" i="1" strike="noStrike" spc="-1" dirty="0">
                 <a:solidFill>
                   <a:srgbClr val="000000"/>
                 </a:solidFill>
@@ -2702,9 +3178,11 @@
               </a:rPr>
               <a:t>Probleme: </a:t>
             </a:r>
-            <a:br/>
-            <a:r>
-              <a:rPr b="0" lang="de-DE" sz="2400" spc="-1" strike="noStrike">
+            <a:br>
+              <a:rPr dirty="0"/>
+            </a:br>
+            <a:r>
+              <a:rPr lang="de-DE" sz="2400" b="0" strike="noStrike" spc="-1" dirty="0">
                 <a:solidFill>
                   <a:srgbClr val="000000"/>
                 </a:solidFill>
@@ -2713,9 +3191,11 @@
               </a:rPr>
               <a:t>- Große Datenmengen durch binäre Grafikdateien</a:t>
             </a:r>
-            <a:br/>
-            <a:r>
-              <a:rPr b="0" lang="de-DE" sz="2400" spc="-1" strike="noStrike">
+            <a:br>
+              <a:rPr dirty="0"/>
+            </a:br>
+            <a:r>
+              <a:rPr lang="de-DE" sz="2400" b="0" strike="noStrike" spc="-1" dirty="0">
                 <a:solidFill>
                   <a:srgbClr val="000000"/>
                 </a:solidFill>
@@ -2724,9 +3204,11 @@
               </a:rPr>
               <a:t>- Keine Filterung von Kartenelementen zur Laufzeit möglich</a:t>
             </a:r>
-            <a:br/>
-            <a:r>
-              <a:rPr b="0" lang="de-DE" sz="2400" spc="-1" strike="noStrike">
+            <a:br>
+              <a:rPr dirty="0"/>
+            </a:br>
+            <a:r>
+              <a:rPr lang="de-DE" sz="2400" b="0" strike="noStrike" spc="-1" dirty="0">
                 <a:solidFill>
                   <a:srgbClr val="000000"/>
                 </a:solidFill>
@@ -2735,7 +3217,7 @@
               </a:rPr>
               <a:t>- Labels drehen sich bei Rotation der Karte mit</a:t>
             </a:r>
-            <a:endParaRPr b="0" lang="de-DE" sz="2400" spc="-1" strike="noStrike">
+            <a:endParaRPr lang="de-DE" sz="2400" b="0" strike="noStrike" spc="-1" dirty="0">
               <a:latin typeface="Arial"/>
             </a:endParaRPr>
           </a:p>
@@ -2745,7 +3227,7 @@
                 <a:spcPct val="100000"/>
               </a:lnSpc>
             </a:pPr>
-            <a:endParaRPr b="0" lang="de-DE" sz="2400" spc="-1" strike="noStrike">
+            <a:endParaRPr lang="de-DE" sz="2400" b="0" strike="noStrike" spc="-1" dirty="0">
               <a:latin typeface="Arial"/>
             </a:endParaRPr>
           </a:p>
@@ -2756,7 +3238,7 @@
               </a:lnSpc>
             </a:pPr>
             <a:r>
-              <a:rPr b="0" i="1" lang="de-DE" sz="2400" spc="-1" strike="noStrike">
+              <a:rPr lang="de-DE" sz="2400" b="0" i="1" strike="noStrike" spc="-1" dirty="0">
                 <a:solidFill>
                   <a:srgbClr val="000000"/>
                 </a:solidFill>
@@ -2765,9 +3247,11 @@
               </a:rPr>
               <a:t>Konzeptioneller Lösungsansatz:</a:t>
             </a:r>
-            <a:br/>
-            <a:r>
-              <a:rPr b="0" lang="de-DE" sz="2400" spc="-1" strike="noStrike">
+            <a:br>
+              <a:rPr dirty="0"/>
+            </a:br>
+            <a:r>
+              <a:rPr lang="de-DE" sz="2400" b="0" strike="noStrike" spc="-1" dirty="0">
                 <a:solidFill>
                   <a:srgbClr val="000000"/>
                 </a:solidFill>
@@ -2776,9 +3260,11 @@
               </a:rPr>
               <a:t>- Client (Browser) fragt benötigte Kartenausschnitte beim Server an</a:t>
             </a:r>
-            <a:br/>
-            <a:r>
-              <a:rPr b="0" lang="de-DE" sz="2400" spc="-1" strike="noStrike">
+            <a:br>
+              <a:rPr dirty="0"/>
+            </a:br>
+            <a:r>
+              <a:rPr lang="de-DE" sz="2400" b="0" strike="noStrike" spc="-1" dirty="0">
                 <a:solidFill>
                   <a:srgbClr val="000000"/>
                 </a:solidFill>
@@ -2787,9 +3273,11 @@
               </a:rPr>
               <a:t>- Übermittlung geografischer Daten statt Grafiken</a:t>
             </a:r>
-            <a:br/>
-            <a:r>
-              <a:rPr b="0" lang="de-DE" sz="2400" spc="-1" strike="noStrike">
+            <a:br>
+              <a:rPr dirty="0"/>
+            </a:br>
+            <a:r>
+              <a:rPr lang="de-DE" sz="2400" b="0" strike="noStrike" spc="-1" dirty="0">
                 <a:solidFill>
                   <a:srgbClr val="000000"/>
                 </a:solidFill>
@@ -2798,9 +3286,11 @@
               </a:rPr>
               <a:t>- Client übernimmt das Rendern der Karte</a:t>
             </a:r>
-            <a:br/>
-            <a:r>
-              <a:rPr b="0" lang="de-DE" sz="2400" spc="-1" strike="noStrike">
+            <a:br>
+              <a:rPr dirty="0"/>
+            </a:br>
+            <a:r>
+              <a:rPr lang="de-DE" sz="2400" b="0" strike="noStrike" spc="-1" dirty="0">
                 <a:solidFill>
                   <a:srgbClr val="000000"/>
                 </a:solidFill>
@@ -2809,7 +3299,7 @@
               </a:rPr>
               <a:t>- Vorverarbeitung der Daten für höhere Effizienz</a:t>
             </a:r>
-            <a:endParaRPr b="0" lang="de-DE" sz="2400" spc="-1" strike="noStrike">
+            <a:endParaRPr lang="de-DE" sz="2400" b="0" strike="noStrike" spc="-1" dirty="0">
               <a:latin typeface="Arial"/>
             </a:endParaRPr>
           </a:p>
@@ -2830,13 +3320,13 @@
             <a:avLst/>
           </a:prstGeom>
           <a:solidFill>
-            <a:srgbClr val="00b0f0"/>
+            <a:srgbClr val="00B0F0"/>
           </a:solidFill>
           <a:ln>
             <a:noFill/>
           </a:ln>
           <a:effectLst>
-            <a:outerShdw algn="tl" blurRad="50800" dir="2700000" dist="37674" rotWithShape="0">
+            <a:outerShdw blurRad="50800" dist="37674" dir="2700000" algn="tl" rotWithShape="0">
               <a:srgbClr val="000000">
                 <a:alpha val="40000"/>
               </a:srgbClr>
@@ -2844,15 +3334,22 @@
           </a:effectLst>
         </p:spPr>
         <p:style>
-          <a:lnRef idx="0"/>
-          <a:fillRef idx="0"/>
-          <a:effectRef idx="0"/>
+          <a:lnRef idx="0">
+            <a:scrgbClr r="0" g="0" b="0"/>
+          </a:lnRef>
+          <a:fillRef idx="0">
+            <a:scrgbClr r="0" g="0" b="0"/>
+          </a:fillRef>
+          <a:effectRef idx="0">
+            <a:scrgbClr r="0" g="0" b="0"/>
+          </a:effectRef>
           <a:fontRef idx="minor"/>
         </p:style>
         <p:txBody>
-          <a:bodyPr lIns="129240" rIns="129240" tIns="64800" bIns="64800">
+          <a:bodyPr lIns="129240" tIns="64800" rIns="129240" bIns="64800">
             <a:noAutofit/>
           </a:bodyPr>
+          <a:lstStyle/>
           <a:p>
             <a:pPr>
               <a:lnSpc>
@@ -2860,26 +3357,16 @@
               </a:lnSpc>
             </a:pPr>
             <a:r>
-              <a:rPr b="0" lang="de-DE" sz="2800" spc="-1" strike="noStrike">
-                <a:solidFill>
-                  <a:srgbClr val="ffffff"/>
-                </a:solidFill>
-                <a:latin typeface="Arial"/>
-                <a:ea typeface="DejaVu Sans"/>
-              </a:rPr>
-              <a:t>                                                 </a:t>
-            </a:r>
-            <a:r>
-              <a:rPr b="0" lang="de-DE" sz="2800" spc="-1" strike="noStrike">
-                <a:solidFill>
-                  <a:srgbClr val="ffffff"/>
-                </a:solidFill>
-                <a:latin typeface="Arial"/>
-                <a:ea typeface="DejaVu Sans"/>
-              </a:rPr>
-              <a:t>Preprocessing</a:t>
-            </a:r>
-            <a:endParaRPr b="0" lang="de-DE" sz="2800" spc="-1" strike="noStrike">
+              <a:rPr lang="de-DE" sz="2800" b="0" strike="noStrike" spc="-1" dirty="0">
+                <a:solidFill>
+                  <a:srgbClr val="FFFFFF"/>
+                </a:solidFill>
+                <a:latin typeface="Arial"/>
+                <a:ea typeface="DejaVu Sans"/>
+              </a:rPr>
+              <a:t>                                                 Vorverarbeitung</a:t>
+            </a:r>
+            <a:endParaRPr lang="de-DE" sz="2800" b="0" strike="noStrike" spc="-1" dirty="0">
               <a:latin typeface="Arial"/>
             </a:endParaRPr>
           </a:p>
@@ -2889,7 +3376,7 @@
                 <a:spcPct val="100000"/>
               </a:lnSpc>
             </a:pPr>
-            <a:endParaRPr b="0" lang="de-DE" sz="2800" spc="-1" strike="noStrike">
+            <a:endParaRPr lang="de-DE" sz="2800" b="0" strike="noStrike" spc="-1" dirty="0">
               <a:latin typeface="Arial"/>
             </a:endParaRPr>
           </a:p>
@@ -2897,12 +3384,12 @@
       </p:sp>
       <p:pic>
         <p:nvPicPr>
-          <p:cNvPr id="55" name="Grafik 4" descr=""/>
+          <p:cNvPr id="55" name="Grafik 4"/>
           <p:cNvPicPr/>
           <p:nvPr/>
         </p:nvPicPr>
         <p:blipFill>
-          <a:blip r:embed="rId4"/>
+          <a:blip r:embed="rId5"/>
           <a:stretch/>
         </p:blipFill>
         <p:spPr>
@@ -2941,38 +3428,21 @@
           </a:ln>
         </p:spPr>
         <p:style>
-          <a:lnRef idx="0"/>
-          <a:fillRef idx="0"/>
-          <a:effectRef idx="0"/>
+          <a:lnRef idx="0">
+            <a:scrgbClr r="0" g="0" b="0"/>
+          </a:lnRef>
+          <a:fillRef idx="0">
+            <a:scrgbClr r="0" g="0" b="0"/>
+          </a:fillRef>
+          <a:effectRef idx="0">
+            <a:scrgbClr r="0" g="0" b="0"/>
+          </a:effectRef>
           <a:fontRef idx="minor"/>
         </p:style>
       </p:sp>
       <p:pic>
         <p:nvPicPr>
-          <p:cNvPr id="57" name="Grafik 15" descr=""/>
-          <p:cNvPicPr/>
-          <p:nvPr/>
-        </p:nvPicPr>
-        <p:blipFill>
-          <a:blip r:embed="rId5"/>
-          <a:stretch/>
-        </p:blipFill>
-        <p:spPr>
-          <a:xfrm>
-            <a:off x="21047040" y="21413160"/>
-            <a:ext cx="6330600" cy="4513680"/>
-          </a:xfrm>
-          <a:prstGeom prst="rect">
-            <a:avLst/>
-          </a:prstGeom>
-          <a:ln>
-            <a:noFill/>
-          </a:ln>
-        </p:spPr>
-      </p:pic>
-      <p:pic>
-        <p:nvPicPr>
-          <p:cNvPr id="58" name="Grafik 19" descr=""/>
+          <p:cNvPr id="57" name="Grafik 15"/>
           <p:cNvPicPr/>
           <p:nvPr/>
         </p:nvPicPr>
@@ -2982,6 +3452,29 @@
         </p:blipFill>
         <p:spPr>
           <a:xfrm>
+            <a:off x="21047040" y="21413160"/>
+            <a:ext cx="6330600" cy="4513680"/>
+          </a:xfrm>
+          <a:prstGeom prst="rect">
+            <a:avLst/>
+          </a:prstGeom>
+          <a:ln>
+            <a:noFill/>
+          </a:ln>
+        </p:spPr>
+      </p:pic>
+      <p:pic>
+        <p:nvPicPr>
+          <p:cNvPr id="58" name="Grafik 19"/>
+          <p:cNvPicPr/>
+          <p:nvPr/>
+        </p:nvPicPr>
+        <p:blipFill>
+          <a:blip r:embed="rId7"/>
+          <a:stretch/>
+        </p:blipFill>
+        <p:spPr>
+          <a:xfrm>
             <a:off x="8815680" y="18182160"/>
             <a:ext cx="5744880" cy="4481640"/>
           </a:xfrm>
@@ -3016,9 +3509,15 @@
           </a:ln>
         </p:spPr>
         <p:style>
-          <a:lnRef idx="0"/>
-          <a:fillRef idx="0"/>
-          <a:effectRef idx="0"/>
+          <a:lnRef idx="0">
+            <a:scrgbClr r="0" g="0" b="0"/>
+          </a:lnRef>
+          <a:fillRef idx="0">
+            <a:scrgbClr r="0" g="0" b="0"/>
+          </a:fillRef>
+          <a:effectRef idx="0">
+            <a:scrgbClr r="0" g="0" b="0"/>
+          </a:effectRef>
           <a:fontRef idx="minor"/>
         </p:style>
       </p:sp>
@@ -3037,13 +3536,13 @@
             <a:avLst/>
           </a:prstGeom>
           <a:solidFill>
-            <a:srgbClr val="00b0f0"/>
+            <a:srgbClr val="00B0F0"/>
           </a:solidFill>
           <a:ln>
             <a:noFill/>
           </a:ln>
           <a:effectLst>
-            <a:outerShdw algn="tl" blurRad="50800" dir="2700000" dist="37674" rotWithShape="0">
+            <a:outerShdw blurRad="50800" dist="37674" dir="2700000" algn="tl" rotWithShape="0">
               <a:srgbClr val="000000">
                 <a:alpha val="40000"/>
               </a:srgbClr>
@@ -3051,15 +3550,22 @@
           </a:effectLst>
         </p:spPr>
         <p:style>
-          <a:lnRef idx="0"/>
-          <a:fillRef idx="0"/>
-          <a:effectRef idx="0"/>
+          <a:lnRef idx="0">
+            <a:scrgbClr r="0" g="0" b="0"/>
+          </a:lnRef>
+          <a:fillRef idx="0">
+            <a:scrgbClr r="0" g="0" b="0"/>
+          </a:fillRef>
+          <a:effectRef idx="0">
+            <a:scrgbClr r="0" g="0" b="0"/>
+          </a:effectRef>
           <a:fontRef idx="minor"/>
         </p:style>
         <p:txBody>
-          <a:bodyPr lIns="129240" rIns="129240" tIns="64800" bIns="64800">
+          <a:bodyPr lIns="129240" tIns="64800" rIns="129240" bIns="64800">
             <a:noAutofit/>
           </a:bodyPr>
+          <a:lstStyle/>
           <a:p>
             <a:pPr>
               <a:lnSpc>
@@ -3067,26 +3573,16 @@
               </a:lnSpc>
             </a:pPr>
             <a:r>
-              <a:rPr b="0" lang="de-DE" sz="2800" spc="-1" strike="noStrike">
-                <a:solidFill>
-                  <a:srgbClr val="ffffff"/>
-                </a:solidFill>
-                <a:latin typeface="Arial"/>
-                <a:ea typeface="DejaVu Sans"/>
-              </a:rPr>
-              <a:t>                                                     </a:t>
-            </a:r>
-            <a:r>
-              <a:rPr b="0" lang="de-DE" sz="2800" spc="-1" strike="noStrike">
-                <a:solidFill>
-                  <a:srgbClr val="ffffff"/>
-                </a:solidFill>
-                <a:latin typeface="Arial"/>
-                <a:ea typeface="DejaVu Sans"/>
-              </a:rPr>
-              <a:t>Gebogene Label</a:t>
-            </a:r>
-            <a:endParaRPr b="0" lang="de-DE" sz="2800" spc="-1" strike="noStrike">
+              <a:rPr lang="de-DE" sz="2800" b="0" strike="noStrike" spc="-1" dirty="0">
+                <a:solidFill>
+                  <a:srgbClr val="FFFFFF"/>
+                </a:solidFill>
+                <a:latin typeface="Arial"/>
+                <a:ea typeface="DejaVu Sans"/>
+              </a:rPr>
+              <a:t>                                                     Gebogene Beschriftungen</a:t>
+            </a:r>
+            <a:endParaRPr lang="de-DE" sz="2800" b="0" strike="noStrike" spc="-1" dirty="0">
               <a:latin typeface="Arial"/>
             </a:endParaRPr>
           </a:p>
@@ -3096,7 +3592,7 @@
                 <a:spcPct val="100000"/>
               </a:lnSpc>
             </a:pPr>
-            <a:endParaRPr b="0" lang="de-DE" sz="2800" spc="-1" strike="noStrike">
+            <a:endParaRPr lang="de-DE" sz="2800" b="0" strike="noStrike" spc="-1" dirty="0">
               <a:latin typeface="Arial"/>
             </a:endParaRPr>
           </a:p>
@@ -3117,13 +3613,13 @@
             <a:avLst/>
           </a:prstGeom>
           <a:solidFill>
-            <a:srgbClr val="00b0f0"/>
+            <a:srgbClr val="00B0F0"/>
           </a:solidFill>
           <a:ln>
             <a:noFill/>
           </a:ln>
           <a:effectLst>
-            <a:outerShdw algn="tl" blurRad="50800" dir="2700000" dist="37674" rotWithShape="0">
+            <a:outerShdw blurRad="50800" dist="37674" dir="2700000" algn="tl" rotWithShape="0">
               <a:srgbClr val="000000">
                 <a:alpha val="40000"/>
               </a:srgbClr>
@@ -3131,15 +3627,22 @@
           </a:effectLst>
         </p:spPr>
         <p:style>
-          <a:lnRef idx="0"/>
-          <a:fillRef idx="0"/>
-          <a:effectRef idx="0"/>
+          <a:lnRef idx="0">
+            <a:scrgbClr r="0" g="0" b="0"/>
+          </a:lnRef>
+          <a:fillRef idx="0">
+            <a:scrgbClr r="0" g="0" b="0"/>
+          </a:fillRef>
+          <a:effectRef idx="0">
+            <a:scrgbClr r="0" g="0" b="0"/>
+          </a:effectRef>
           <a:fontRef idx="minor"/>
         </p:style>
         <p:txBody>
-          <a:bodyPr lIns="129240" rIns="129240" tIns="64800" bIns="64800">
+          <a:bodyPr lIns="129240" tIns="64800" rIns="129240" bIns="64800">
             <a:noAutofit/>
           </a:bodyPr>
+          <a:lstStyle/>
           <a:p>
             <a:pPr>
               <a:lnSpc>
@@ -3147,26 +3650,16 @@
               </a:lnSpc>
             </a:pPr>
             <a:r>
-              <a:rPr b="0" lang="de-DE" sz="2800" spc="-1" strike="noStrike">
-                <a:solidFill>
-                  <a:srgbClr val="ffffff"/>
-                </a:solidFill>
-                <a:latin typeface="Arial"/>
-                <a:ea typeface="DejaVu Sans"/>
-              </a:rPr>
-              <a:t>                                                    </a:t>
-            </a:r>
-            <a:r>
-              <a:rPr b="0" lang="de-DE" sz="2800" spc="-1" strike="noStrike">
-                <a:solidFill>
-                  <a:srgbClr val="ffffff"/>
-                </a:solidFill>
-                <a:latin typeface="Arial"/>
-                <a:ea typeface="DejaVu Sans"/>
-              </a:rPr>
-              <a:t>Grenzvereinfachung</a:t>
-            </a:r>
-            <a:endParaRPr b="0" lang="de-DE" sz="2800" spc="-1" strike="noStrike">
+              <a:rPr lang="de-DE" sz="2800" b="0" strike="noStrike" spc="-1">
+                <a:solidFill>
+                  <a:srgbClr val="FFFFFF"/>
+                </a:solidFill>
+                <a:latin typeface="Arial"/>
+                <a:ea typeface="DejaVu Sans"/>
+              </a:rPr>
+              <a:t>                                                    Grenzvereinfachung</a:t>
+            </a:r>
+            <a:endParaRPr lang="de-DE" sz="2800" b="0" strike="noStrike" spc="-1">
               <a:latin typeface="Arial"/>
             </a:endParaRPr>
           </a:p>
@@ -3176,7 +3669,7 @@
                 <a:spcPct val="100000"/>
               </a:lnSpc>
             </a:pPr>
-            <a:endParaRPr b="0" lang="de-DE" sz="2800" spc="-1" strike="noStrike">
+            <a:endParaRPr lang="de-DE" sz="2800" b="0" strike="noStrike" spc="-1">
               <a:latin typeface="Arial"/>
             </a:endParaRPr>
           </a:p>
@@ -3205,9 +3698,15 @@
           </a:ln>
         </p:spPr>
         <p:style>
-          <a:lnRef idx="0"/>
-          <a:fillRef idx="0"/>
-          <a:effectRef idx="0"/>
+          <a:lnRef idx="0">
+            <a:scrgbClr r="0" g="0" b="0"/>
+          </a:lnRef>
+          <a:fillRef idx="0">
+            <a:scrgbClr r="0" g="0" b="0"/>
+          </a:fillRef>
+          <a:effectRef idx="0">
+            <a:scrgbClr r="0" g="0" b="0"/>
+          </a:effectRef>
           <a:fontRef idx="minor"/>
         </p:style>
       </p:sp>
@@ -3220,7 +3719,7 @@
         <p:spPr>
           <a:xfrm>
             <a:off x="15961320" y="27979200"/>
-            <a:ext cx="12104640" cy="4845240"/>
+            <a:ext cx="12104640" cy="4153530"/>
           </a:xfrm>
           <a:prstGeom prst="rect">
             <a:avLst/>
@@ -3231,15 +3730,22 @@
           </a:ln>
         </p:spPr>
         <p:style>
-          <a:lnRef idx="0"/>
-          <a:fillRef idx="0"/>
-          <a:effectRef idx="0"/>
+          <a:lnRef idx="0">
+            <a:scrgbClr r="0" g="0" b="0"/>
+          </a:lnRef>
+          <a:fillRef idx="0">
+            <a:scrgbClr r="0" g="0" b="0"/>
+          </a:fillRef>
+          <a:effectRef idx="0">
+            <a:scrgbClr r="0" g="0" b="0"/>
+          </a:effectRef>
           <a:fontRef idx="minor"/>
         </p:style>
         <p:txBody>
-          <a:bodyPr lIns="90000" rIns="90000" tIns="45000" bIns="45000">
+          <a:bodyPr lIns="90000" tIns="45000" rIns="90000" bIns="45000">
             <a:spAutoFit/>
           </a:bodyPr>
+          <a:lstStyle/>
           <a:p>
             <a:pPr>
               <a:lnSpc>
@@ -3247,18 +3753,15 @@
               </a:lnSpc>
             </a:pPr>
             <a:r>
-              <a:rPr b="0" lang="de-DE" sz="2400" spc="-1" strike="noStrike">
-                <a:solidFill>
-                  <a:srgbClr val="000000"/>
-                </a:solidFill>
-                <a:latin typeface="Arial"/>
-                <a:ea typeface="DejaVu Sans"/>
-              </a:rPr>
-              <a:t>Zunächst werden anhand der zu vereinfachenden Grenzen überscheidungsfreie Linienzüge berechnet. Teilgrenzen, die mehreren benachbarten Gebieten angehören, werden somit später nur einmal vereinfacht. Dies verhindert, dass besagtes Teilstück für beide Grenzen unterschiedlich vereinfacht wird, und beide vereinfachten Grenzen somit überlappen oder Lücken zwischen diesen entstehen.</a:t>
-            </a:r>
-            <a:endParaRPr b="0" lang="de-DE" sz="2400" spc="-1" strike="noStrike">
-              <a:latin typeface="Arial"/>
-            </a:endParaRPr>
+              <a:rPr lang="de-DE" sz="2400" b="0" strike="noStrike" spc="-1" dirty="0">
+                <a:solidFill>
+                  <a:srgbClr val="000000"/>
+                </a:solidFill>
+                <a:latin typeface="Arial"/>
+                <a:ea typeface="DejaVu Sans"/>
+              </a:rPr>
+              <a:t>Um den Netzwerkverkehr gering zu halten, werden die Gebiete in Abhängigkeit von der Zoomstufe der Karte mit unterschiedlichem Detailgrad ausgeliefert.</a:t>
+            </a:r>
           </a:p>
           <a:p>
             <a:pPr>
@@ -3266,8 +3769,12 @@
                 <a:spcPct val="100000"/>
               </a:lnSpc>
             </a:pPr>
-            <a:endParaRPr b="0" lang="de-DE" sz="2400" spc="-1" strike="noStrike">
-              <a:latin typeface="Arial"/>
+            <a:endParaRPr lang="de-DE" sz="2400" spc="-1" dirty="0">
+              <a:solidFill>
+                <a:srgbClr val="000000"/>
+              </a:solidFill>
+              <a:latin typeface="Arial"/>
+              <a:ea typeface="DejaVu Sans"/>
             </a:endParaRPr>
           </a:p>
           <a:p>
@@ -3277,16 +3784,36 @@
               </a:lnSpc>
             </a:pPr>
             <a:r>
-              <a:rPr b="0" lang="de-DE" sz="2400" spc="-1" strike="noStrike">
-                <a:solidFill>
-                  <a:srgbClr val="000000"/>
-                </a:solidFill>
-                <a:latin typeface="Arial"/>
-                <a:ea typeface="DejaVu Sans"/>
-              </a:rPr>
-              <a:t>Vereinfachung dann je nach Zoomstufe, Vereinfachungsgrad linear zu Kartenmaßstab anhand des Algorithmuses in [1].</a:t>
-            </a:r>
-            <a:endParaRPr b="0" lang="de-DE" sz="2400" spc="-1" strike="noStrike">
+              <a:rPr lang="de-DE" sz="2400" b="0" strike="noStrike" spc="-1" dirty="0">
+                <a:solidFill>
+                  <a:srgbClr val="000000"/>
+                </a:solidFill>
+                <a:latin typeface="Arial"/>
+                <a:ea typeface="DejaVu Sans"/>
+              </a:rPr>
+              <a:t>Dafür werden während der Vorverarbeitung zunächst überscheidungsfreie Linienzüge für die Grenzen berechnet. Dies verhindert, dass ein </a:t>
+            </a:r>
+            <a:r>
+              <a:rPr lang="de-DE" sz="2400" spc="-1" dirty="0">
+                <a:solidFill>
+                  <a:srgbClr val="000000"/>
+                </a:solidFill>
+                <a:latin typeface="Arial"/>
+                <a:ea typeface="DejaVu Sans"/>
+              </a:rPr>
+              <a:t>Teilstück, das zu zwei Gebieten gehört, für beide </a:t>
+            </a:r>
+            <a:r>
+              <a:rPr lang="de-DE" sz="2400" b="0" strike="noStrike" spc="-1" dirty="0">
+                <a:solidFill>
+                  <a:srgbClr val="000000"/>
+                </a:solidFill>
+                <a:latin typeface="Arial"/>
+                <a:ea typeface="DejaVu Sans"/>
+              </a:rPr>
+              <a:t>unterschiedlich vereinfacht wird und somit Überlappungen oder Lücken entstehen. Anschließend werden die Linienzüge unter Erhaltung der ursprünglichen Topologie für unterschiedliche Zoomstufen vereinfacht und in der Datenbank gespeichert.</a:t>
+            </a:r>
+            <a:endParaRPr lang="de-DE" sz="2400" b="0" strike="noStrike" spc="-1" dirty="0">
               <a:latin typeface="Arial"/>
             </a:endParaRPr>
           </a:p>
@@ -3296,17 +3823,7 @@
                 <a:spcPct val="100000"/>
               </a:lnSpc>
             </a:pPr>
-            <a:r>
-              <a:rPr b="0" lang="de-DE" sz="2400" spc="-1" strike="noStrike">
-                <a:solidFill>
-                  <a:srgbClr val="000000"/>
-                </a:solidFill>
-                <a:latin typeface="Arial"/>
-                <a:ea typeface="DejaVu Sans"/>
-              </a:rPr>
-              <a:t>Mit sinkender Zoomstufe ( Herauszoomen ) deutlich weniger Punkte pro Grenze. Möglichkeit: Constraint Punkte, die immer im Gebiet liegen müssen.</a:t>
-            </a:r>
-            <a:endParaRPr b="0" lang="de-DE" sz="2400" spc="-1" strike="noStrike">
+            <a:endParaRPr lang="de-DE" sz="2400" b="0" strike="noStrike" spc="-1" dirty="0">
               <a:latin typeface="Arial"/>
             </a:endParaRPr>
           </a:p>
@@ -3316,17 +3833,75 @@
                 <a:spcPct val="100000"/>
               </a:lnSpc>
             </a:pPr>
-            <a:endParaRPr b="0" lang="de-DE" sz="2400" spc="-1" strike="noStrike">
-              <a:latin typeface="Arial"/>
-            </a:endParaRPr>
-          </a:p>
+            <a:endParaRPr lang="de-DE" sz="2400" b="0" strike="noStrike" spc="-1" dirty="0">
+              <a:latin typeface="Arial"/>
+            </a:endParaRPr>
+          </a:p>
+        </p:txBody>
+      </p:sp>
+      <p:sp>
+        <p:nvSpPr>
+          <p:cNvPr id="64" name="CustomShape 18"/>
+          <p:cNvSpPr/>
+          <p:nvPr/>
+        </p:nvSpPr>
+        <p:spPr>
+          <a:xfrm>
+            <a:off x="2229480" y="31411800"/>
+            <a:ext cx="12301920" cy="2676202"/>
+          </a:xfrm>
+          <a:prstGeom prst="rect">
+            <a:avLst/>
+          </a:prstGeom>
+          <a:noFill/>
+          <a:ln>
+            <a:noFill/>
+          </a:ln>
+        </p:spPr>
+        <p:style>
+          <a:lnRef idx="0">
+            <a:scrgbClr r="0" g="0" b="0"/>
+          </a:lnRef>
+          <a:fillRef idx="0">
+            <a:scrgbClr r="0" g="0" b="0"/>
+          </a:fillRef>
+          <a:effectRef idx="0">
+            <a:scrgbClr r="0" g="0" b="0"/>
+          </a:effectRef>
+          <a:fontRef idx="minor"/>
+        </p:style>
+        <p:txBody>
+          <a:bodyPr lIns="90000" tIns="45000" rIns="90000" bIns="45000">
+            <a:spAutoFit/>
+          </a:bodyPr>
+          <a:lstStyle/>
           <a:p>
             <a:pPr>
               <a:lnSpc>
                 <a:spcPct val="100000"/>
               </a:lnSpc>
             </a:pPr>
-            <a:endParaRPr b="0" lang="de-DE" sz="2400" spc="-1" strike="noStrike">
+            <a:r>
+              <a:rPr lang="de-DE" sz="2400" b="1" strike="noStrike" spc="-1" dirty="0">
+                <a:solidFill>
+                  <a:srgbClr val="000000"/>
+                </a:solidFill>
+                <a:latin typeface="Arial"/>
+                <a:ea typeface="DejaVu Sans"/>
+              </a:rPr>
+              <a:t>Trump-client</a:t>
+            </a:r>
+            <a:r>
+              <a:rPr lang="de-DE" sz="2400" b="0" strike="noStrike" spc="-1" dirty="0">
+                <a:solidFill>
+                  <a:srgbClr val="000000"/>
+                </a:solidFill>
+                <a:latin typeface="Arial"/>
+                <a:ea typeface="DejaVu Sans"/>
+              </a:rPr>
+              <a:t>: Fordert Daten für einen gegebenen Kartenausschnitt an</a:t>
+            </a:r>
+            <a:endParaRPr lang="de-DE" sz="2400" b="0" strike="noStrike" spc="-1" dirty="0">
               <a:latin typeface="Arial"/>
             </a:endParaRPr>
           </a:p>
@@ -3336,41 +3911,60 @@
                 <a:spcPct val="100000"/>
               </a:lnSpc>
             </a:pPr>
-            <a:endParaRPr b="0" lang="de-DE" sz="2400" spc="-1" strike="noStrike">
-              <a:latin typeface="Arial"/>
-            </a:endParaRPr>
-          </a:p>
-        </p:txBody>
-      </p:sp>
-      <p:sp>
-        <p:nvSpPr>
-          <p:cNvPr id="64" name="CustomShape 18"/>
-          <p:cNvSpPr/>
-          <p:nvPr/>
-        </p:nvSpPr>
-        <p:spPr>
-          <a:xfrm>
-            <a:off x="2229480" y="31411800"/>
-            <a:ext cx="12301920" cy="3016440"/>
-          </a:xfrm>
-          <a:prstGeom prst="rect">
-            <a:avLst/>
-          </a:prstGeom>
-          <a:noFill/>
-          <a:ln>
-            <a:noFill/>
-          </a:ln>
-        </p:spPr>
-        <p:style>
-          <a:lnRef idx="0"/>
-          <a:fillRef idx="0"/>
-          <a:effectRef idx="0"/>
-          <a:fontRef idx="minor"/>
-        </p:style>
-        <p:txBody>
-          <a:bodyPr lIns="90000" rIns="90000" tIns="45000" bIns="45000">
-            <a:spAutoFit/>
-          </a:bodyPr>
+            <a:r>
+              <a:rPr lang="de-DE" sz="2400" b="1" strike="noStrike" spc="-1" dirty="0">
+                <a:solidFill>
+                  <a:srgbClr val="000000"/>
+                </a:solidFill>
+                <a:latin typeface="Arial"/>
+                <a:ea typeface="DejaVu Sans"/>
+              </a:rPr>
+              <a:t>Trump-</a:t>
+            </a:r>
+            <a:r>
+              <a:rPr lang="de-DE" sz="2400" b="1" strike="noStrike" spc="-1" dirty="0" err="1">
+                <a:solidFill>
+                  <a:srgbClr val="000000"/>
+                </a:solidFill>
+                <a:latin typeface="Arial"/>
+                <a:ea typeface="DejaVu Sans"/>
+              </a:rPr>
+              <a:t>mapnik</a:t>
+            </a:r>
+            <a:r>
+              <a:rPr lang="de-DE" sz="2400" b="0" strike="noStrike" spc="-1" dirty="0">
+                <a:solidFill>
+                  <a:srgbClr val="000000"/>
+                </a:solidFill>
+                <a:latin typeface="Arial"/>
+                <a:ea typeface="DejaVu Sans"/>
+              </a:rPr>
+              <a:t>: Stellt dem Client vor-gerenderte </a:t>
+            </a:r>
+            <a:r>
+              <a:rPr lang="de-DE" sz="2400" b="0" strike="noStrike" spc="-1" dirty="0" err="1">
+                <a:solidFill>
+                  <a:srgbClr val="000000"/>
+                </a:solidFill>
+                <a:latin typeface="Arial"/>
+                <a:ea typeface="DejaVu Sans"/>
+              </a:rPr>
+              <a:t>Tiles</a:t>
+            </a:r>
+            <a:r>
+              <a:rPr lang="de-DE" sz="2400" b="0" strike="noStrike" spc="-1" dirty="0">
+                <a:solidFill>
+                  <a:srgbClr val="000000"/>
+                </a:solidFill>
+                <a:latin typeface="Arial"/>
+                <a:ea typeface="DejaVu Sans"/>
+              </a:rPr>
+              <a:t> bereit, sofern gewünscht</a:t>
+            </a:r>
+            <a:endParaRPr lang="de-DE" sz="2400" b="0" strike="noStrike" spc="-1" dirty="0">
+              <a:latin typeface="Arial"/>
+            </a:endParaRPr>
+          </a:p>
           <a:p>
             <a:pPr>
               <a:lnSpc>
@@ -3378,26 +3972,26 @@
               </a:lnSpc>
             </a:pPr>
             <a:r>
-              <a:rPr b="1" lang="de-DE" sz="2400" spc="-1" strike="noStrike">
-                <a:solidFill>
-                  <a:srgbClr val="000000"/>
-                </a:solidFill>
-                <a:latin typeface="Arial"/>
-                <a:ea typeface="DejaVu Sans"/>
-              </a:rPr>
-              <a:t>Trump-client</a:t>
-            </a:r>
-            <a:r>
-              <a:rPr b="0" lang="de-DE" sz="2400" spc="-1" strike="noStrike">
-                <a:solidFill>
-                  <a:srgbClr val="000000"/>
-                </a:solidFill>
-                <a:latin typeface="Arial"/>
-                <a:ea typeface="DejaVu Sans"/>
-              </a:rPr>
-              <a:t>: Fordert Daten für einen gegebenen Kartenausschnitt an</a:t>
-            </a:r>
-            <a:endParaRPr b="0" lang="de-DE" sz="2400" spc="-1" strike="noStrike">
+              <a:rPr lang="de-DE" sz="2400" b="1" strike="noStrike" spc="-1" dirty="0">
+                <a:solidFill>
+                  <a:srgbClr val="000000"/>
+                </a:solidFill>
+                <a:latin typeface="Arial"/>
+                <a:ea typeface="DejaVu Sans"/>
+              </a:rPr>
+              <a:t>Trump-area</a:t>
+            </a:r>
+            <a:r>
+              <a:rPr lang="de-DE" sz="2400" b="0" strike="noStrike" spc="-1" dirty="0">
+                <a:solidFill>
+                  <a:srgbClr val="000000"/>
+                </a:solidFill>
+                <a:latin typeface="Arial"/>
+                <a:ea typeface="DejaVu Sans"/>
+              </a:rPr>
+              <a:t>: Server, der dem Client Grenzen und gebogene Beschriftungen bereitstellt</a:t>
+            </a:r>
+            <a:endParaRPr lang="de-DE" sz="2400" b="0" strike="noStrike" spc="-1" dirty="0">
               <a:latin typeface="Arial"/>
             </a:endParaRPr>
           </a:p>
@@ -3408,26 +4002,44 @@
               </a:lnSpc>
             </a:pPr>
             <a:r>
-              <a:rPr b="1" lang="de-DE" sz="2400" spc="-1" strike="noStrike">
-                <a:solidFill>
-                  <a:srgbClr val="000000"/>
-                </a:solidFill>
-                <a:latin typeface="Arial"/>
-                <a:ea typeface="DejaVu Sans"/>
-              </a:rPr>
-              <a:t>Trump-mapnik</a:t>
-            </a:r>
-            <a:r>
-              <a:rPr b="0" lang="de-DE" sz="2400" spc="-1" strike="noStrike">
-                <a:solidFill>
-                  <a:srgbClr val="000000"/>
-                </a:solidFill>
-                <a:latin typeface="Arial"/>
-                <a:ea typeface="DejaVu Sans"/>
-              </a:rPr>
-              <a:t>: Stellt dem Client vor-gerenderte Tiles bereit, sofern dies gewüscht ist</a:t>
-            </a:r>
-            <a:endParaRPr b="0" lang="de-DE" sz="2400" spc="-1" strike="noStrike">
+              <a:rPr lang="de-DE" sz="2400" b="1" strike="noStrike" spc="-1" dirty="0">
+                <a:solidFill>
+                  <a:srgbClr val="000000"/>
+                </a:solidFill>
+                <a:latin typeface="Arial"/>
+                <a:ea typeface="DejaVu Sans"/>
+              </a:rPr>
+              <a:t>Trump-label</a:t>
+            </a:r>
+            <a:r>
+              <a:rPr lang="de-DE" sz="2400" b="0" strike="noStrike" spc="-1" dirty="0">
+                <a:solidFill>
+                  <a:srgbClr val="000000"/>
+                </a:solidFill>
+                <a:latin typeface="Arial"/>
+                <a:ea typeface="DejaVu Sans"/>
+              </a:rPr>
+              <a:t>: Stellt überschneidungsfreie </a:t>
+            </a:r>
+            <a:r>
+              <a:rPr lang="de-DE" sz="2400" spc="-1" dirty="0">
+                <a:solidFill>
+                  <a:srgbClr val="000000"/>
+                </a:solidFill>
+              </a:rPr>
+              <a:t>Punktbeschriftungen </a:t>
+            </a:r>
+            <a:r>
+              <a:rPr lang="de-DE" sz="2400" b="0" strike="noStrike" spc="-1" dirty="0">
+                <a:solidFill>
+                  <a:srgbClr val="000000"/>
+                </a:solidFill>
+                <a:latin typeface="Arial"/>
+                <a:ea typeface="DejaVu Sans"/>
+              </a:rPr>
+              <a:t>bereit</a:t>
+            </a:r>
+            <a:endParaRPr lang="de-DE" sz="2400" b="0" strike="noStrike" spc="-1" dirty="0">
               <a:latin typeface="Arial"/>
             </a:endParaRPr>
           </a:p>
@@ -3438,26 +4050,56 @@
               </a:lnSpc>
             </a:pPr>
             <a:r>
-              <a:rPr b="1" lang="de-DE" sz="2400" spc="-1" strike="noStrike">
-                <a:solidFill>
-                  <a:srgbClr val="000000"/>
-                </a:solidFill>
-                <a:latin typeface="Arial"/>
-                <a:ea typeface="DejaVu Sans"/>
-              </a:rPr>
-              <a:t>Trump-area</a:t>
-            </a:r>
-            <a:r>
-              <a:rPr b="0" lang="de-DE" sz="2400" spc="-1" strike="noStrike">
-                <a:solidFill>
-                  <a:srgbClr val="000000"/>
-                </a:solidFill>
-                <a:latin typeface="Arial"/>
-                <a:ea typeface="DejaVu Sans"/>
-              </a:rPr>
-              <a:t>: Stellt dem Client Grenzen und gebogene Label bereit, liest diese aus der Datenbank</a:t>
-            </a:r>
-            <a:endParaRPr b="0" lang="de-DE" sz="2400" spc="-1" strike="noStrike">
+              <a:rPr lang="de-DE" sz="2400" b="1" strike="noStrike" spc="-1" dirty="0">
+                <a:solidFill>
+                  <a:srgbClr val="000000"/>
+                </a:solidFill>
+                <a:latin typeface="Arial"/>
+                <a:ea typeface="DejaVu Sans"/>
+              </a:rPr>
+              <a:t>Trump-</a:t>
+            </a:r>
+            <a:r>
+              <a:rPr lang="de-DE" sz="2400" b="1" strike="noStrike" spc="-1" dirty="0" err="1">
+                <a:solidFill>
+                  <a:srgbClr val="000000"/>
+                </a:solidFill>
+                <a:latin typeface="Arial"/>
+                <a:ea typeface="DejaVu Sans"/>
+              </a:rPr>
+              <a:t>preprocessing</a:t>
+            </a:r>
+            <a:r>
+              <a:rPr lang="de-DE" sz="2400" b="0" strike="noStrike" spc="-1" dirty="0">
+                <a:solidFill>
+                  <a:srgbClr val="000000"/>
+                </a:solidFill>
+                <a:latin typeface="Arial"/>
+                <a:ea typeface="DejaVu Sans"/>
+              </a:rPr>
+              <a:t>: </a:t>
+            </a:r>
+            <a:r>
+              <a:rPr lang="de-DE" sz="2400" spc="-1" dirty="0">
+                <a:solidFill>
+                  <a:srgbClr val="000000"/>
+                </a:solidFill>
+                <a:latin typeface="Arial"/>
+                <a:ea typeface="DejaVu Sans"/>
+              </a:rPr>
+              <a:t>Vereinfacht Grenzen für </a:t>
+            </a:r>
+            <a:r>
+              <a:rPr lang="de-DE" sz="2400" b="0" strike="noStrike" spc="-1" dirty="0">
+                <a:solidFill>
+                  <a:srgbClr val="000000"/>
+                </a:solidFill>
+                <a:latin typeface="Arial"/>
+                <a:ea typeface="DejaVu Sans"/>
+              </a:rPr>
+              <a:t>verschiedene Zoomstufen und berechnet die Position und Form der gebogenen Beschriftungen</a:t>
+            </a:r>
+            <a:endParaRPr lang="de-DE" sz="2400" b="0" strike="noStrike" spc="-1" dirty="0">
               <a:latin typeface="Arial"/>
             </a:endParaRPr>
           </a:p>
@@ -3468,86 +4110,46 @@
               </a:lnSpc>
             </a:pPr>
             <a:r>
-              <a:rPr b="1" lang="de-DE" sz="2400" spc="-1" strike="noStrike">
-                <a:solidFill>
-                  <a:srgbClr val="000000"/>
-                </a:solidFill>
-                <a:latin typeface="Arial"/>
-                <a:ea typeface="DejaVu Sans"/>
-              </a:rPr>
-              <a:t>Trump-label</a:t>
-            </a:r>
-            <a:r>
-              <a:rPr b="0" lang="de-DE" sz="2400" spc="-1" strike="noStrike">
-                <a:solidFill>
-                  <a:srgbClr val="000000"/>
-                </a:solidFill>
-                <a:latin typeface="Arial"/>
-                <a:ea typeface="DejaVu Sans"/>
-              </a:rPr>
-              <a:t>: Stellt überschneidungsfreie Punktlabel bereit</a:t>
-            </a:r>
-            <a:endParaRPr b="0" lang="de-DE" sz="2400" spc="-1" strike="noStrike">
-              <a:latin typeface="Arial"/>
-            </a:endParaRPr>
-          </a:p>
-          <a:p>
-            <a:pPr>
-              <a:lnSpc>
-                <a:spcPct val="100000"/>
-              </a:lnSpc>
-            </a:pPr>
-            <a:r>
-              <a:rPr b="1" lang="de-DE" sz="2400" spc="-1" strike="noStrike">
-                <a:solidFill>
-                  <a:srgbClr val="000000"/>
-                </a:solidFill>
-                <a:latin typeface="Arial"/>
-                <a:ea typeface="DejaVu Sans"/>
-              </a:rPr>
-              <a:t>Trump-preprocessing</a:t>
-            </a:r>
-            <a:r>
-              <a:rPr b="0" lang="de-DE" sz="2400" spc="-1" strike="noStrike">
-                <a:solidFill>
-                  <a:srgbClr val="000000"/>
-                </a:solidFill>
-                <a:latin typeface="Arial"/>
-                <a:ea typeface="DejaVu Sans"/>
-              </a:rPr>
-              <a:t>: Grenzen werden für verschiedene Zoomstufen vereinfacht und Position der gebogenen Label wird je Grenze berechnet</a:t>
-            </a:r>
-            <a:endParaRPr b="0" lang="de-DE" sz="2400" spc="-1" strike="noStrike">
-              <a:latin typeface="Arial"/>
-            </a:endParaRPr>
-          </a:p>
-          <a:p>
-            <a:pPr>
-              <a:lnSpc>
-                <a:spcPct val="100000"/>
-              </a:lnSpc>
-            </a:pPr>
-            <a:r>
-              <a:rPr b="1" lang="de-DE" sz="2400" spc="-1" strike="noStrike">
-                <a:solidFill>
-                  <a:srgbClr val="000000"/>
-                </a:solidFill>
-                <a:latin typeface="Arial"/>
-                <a:ea typeface="DejaVu Sans"/>
-              </a:rPr>
-              <a:t>Trump-postgis: </a:t>
-            </a:r>
-            <a:r>
-              <a:rPr b="0" lang="de-DE" sz="2400" spc="-1" strike="noStrike">
-                <a:solidFill>
-                  <a:srgbClr val="000000"/>
-                </a:solidFill>
-                <a:latin typeface="Arial"/>
-                <a:ea typeface="DejaVu Sans"/>
-              </a:rPr>
-              <a:t>Datenbank enthält die vorverarbeiteten Daten</a:t>
-            </a:r>
-            <a:endParaRPr b="0" lang="de-DE" sz="2400" spc="-1" strike="noStrike">
+              <a:rPr lang="de-DE" sz="2400" b="1" strike="noStrike" spc="-1" dirty="0">
+                <a:solidFill>
+                  <a:srgbClr val="000000"/>
+                </a:solidFill>
+                <a:latin typeface="Arial"/>
+                <a:ea typeface="DejaVu Sans"/>
+              </a:rPr>
+              <a:t>Trump-</a:t>
+            </a:r>
+            <a:r>
+              <a:rPr lang="de-DE" sz="2400" b="1" strike="noStrike" spc="-1" dirty="0" err="1">
+                <a:solidFill>
+                  <a:srgbClr val="000000"/>
+                </a:solidFill>
+                <a:latin typeface="Arial"/>
+                <a:ea typeface="DejaVu Sans"/>
+              </a:rPr>
+              <a:t>postgis</a:t>
+            </a:r>
+            <a:r>
+              <a:rPr lang="de-DE" sz="2400" b="1" strike="noStrike" spc="-1" dirty="0">
+                <a:solidFill>
+                  <a:srgbClr val="000000"/>
+                </a:solidFill>
+                <a:latin typeface="Arial"/>
+                <a:ea typeface="DejaVu Sans"/>
+              </a:rPr>
+              <a:t>: </a:t>
+            </a:r>
+            <a:r>
+              <a:rPr lang="de-DE" sz="2400" b="0" strike="noStrike" spc="-1" dirty="0">
+                <a:solidFill>
+                  <a:srgbClr val="000000"/>
+                </a:solidFill>
+                <a:latin typeface="Arial"/>
+                <a:ea typeface="DejaVu Sans"/>
+              </a:rPr>
+              <a:t>Datenbank, die die vorverarbeiteten Daten enthält</a:t>
+            </a:r>
+            <a:endParaRPr lang="de-DE" sz="2400" b="0" strike="noStrike" spc="-1" dirty="0">
               <a:latin typeface="Arial"/>
             </a:endParaRPr>
           </a:p>
@@ -3555,30 +4157,7 @@
       </p:sp>
       <p:pic>
         <p:nvPicPr>
-          <p:cNvPr id="65" name="Grafik 8" descr=""/>
-          <p:cNvPicPr/>
-          <p:nvPr/>
-        </p:nvPicPr>
-        <p:blipFill>
-          <a:blip r:embed="rId7"/>
-          <a:stretch/>
-        </p:blipFill>
-        <p:spPr>
-          <a:xfrm>
-            <a:off x="16860600" y="32318280"/>
-            <a:ext cx="4619880" cy="3419640"/>
-          </a:xfrm>
-          <a:prstGeom prst="rect">
-            <a:avLst/>
-          </a:prstGeom>
-          <a:ln>
-            <a:noFill/>
-          </a:ln>
-        </p:spPr>
-      </p:pic>
-      <p:pic>
-        <p:nvPicPr>
-          <p:cNvPr id="66" name="Grafik 10" descr=""/>
+          <p:cNvPr id="65" name="Grafik 8"/>
           <p:cNvPicPr/>
           <p:nvPr/>
         </p:nvPicPr>
@@ -3588,8 +4167,8 @@
         </p:blipFill>
         <p:spPr>
           <a:xfrm>
-            <a:off x="22380480" y="32438520"/>
-            <a:ext cx="4610520" cy="3409920"/>
+            <a:off x="16860600" y="32318280"/>
+            <a:ext cx="4619880" cy="3419640"/>
           </a:xfrm>
           <a:prstGeom prst="rect">
             <a:avLst/>
@@ -3599,6 +4178,29 @@
           </a:ln>
         </p:spPr>
       </p:pic>
+      <p:pic>
+        <p:nvPicPr>
+          <p:cNvPr id="66" name="Grafik 10"/>
+          <p:cNvPicPr/>
+          <p:nvPr/>
+        </p:nvPicPr>
+        <p:blipFill>
+          <a:blip r:embed="rId9"/>
+          <a:stretch/>
+        </p:blipFill>
+        <p:spPr>
+          <a:xfrm>
+            <a:off x="22380480" y="32438520"/>
+            <a:ext cx="4610520" cy="3409920"/>
+          </a:xfrm>
+          <a:prstGeom prst="rect">
+            <a:avLst/>
+          </a:prstGeom>
+          <a:ln>
+            <a:noFill/>
+          </a:ln>
+        </p:spPr>
+      </p:pic>
       <p:sp>
         <p:nvSpPr>
           <p:cNvPr id="67" name="CustomShape 19"/>
@@ -3608,7 +4210,7 @@
         <p:spPr>
           <a:xfrm>
             <a:off x="15961320" y="36781920"/>
-            <a:ext cx="12104640" cy="1187640"/>
+            <a:ext cx="12104640" cy="1198875"/>
           </a:xfrm>
           <a:prstGeom prst="rect">
             <a:avLst/>
@@ -3619,15 +4221,22 @@
           </a:ln>
         </p:spPr>
         <p:style>
-          <a:lnRef idx="0"/>
-          <a:fillRef idx="0"/>
-          <a:effectRef idx="0"/>
+          <a:lnRef idx="0">
+            <a:scrgbClr r="0" g="0" b="0"/>
+          </a:lnRef>
+          <a:fillRef idx="0">
+            <a:scrgbClr r="0" g="0" b="0"/>
+          </a:fillRef>
+          <a:effectRef idx="0">
+            <a:scrgbClr r="0" g="0" b="0"/>
+          </a:effectRef>
           <a:fontRef idx="minor"/>
         </p:style>
         <p:txBody>
-          <a:bodyPr lIns="90000" rIns="90000" tIns="45000" bIns="45000">
+          <a:bodyPr lIns="90000" tIns="45000" rIns="90000" bIns="45000">
             <a:spAutoFit/>
           </a:bodyPr>
+          <a:lstStyle/>
           <a:p>
             <a:pPr>
               <a:lnSpc>
@@ -3635,19 +4244,57 @@
               </a:lnSpc>
             </a:pPr>
             <a:r>
-              <a:rPr b="0" lang="de-DE" sz="2400" spc="-1" strike="noStrike">
-                <a:solidFill>
-                  <a:srgbClr val="000000"/>
-                </a:solidFill>
-                <a:latin typeface="Arial"/>
-                <a:ea typeface="DejaVu Sans"/>
-              </a:rPr>
-              <a:t>In der Abbildung sind die Gebiete Waiblingen, Kernen im Remstal und Fellbach ohne Vereinfachung (links), sowie mit Vereinfachung für Zoomstufe 11 (rechts) zu betrachten.</a:t>
-            </a:r>
-            <a:endParaRPr b="0" lang="de-DE" sz="2400" spc="-1" strike="noStrike">
-              <a:latin typeface="Arial"/>
-            </a:endParaRPr>
-          </a:p>
+              <a:rPr lang="de-DE" sz="2400" b="0" strike="noStrike" spc="-1" dirty="0">
+                <a:solidFill>
+                  <a:srgbClr val="000000"/>
+                </a:solidFill>
+                <a:latin typeface="Arial"/>
+                <a:ea typeface="DejaVu Sans"/>
+              </a:rPr>
+              <a:t>In der Abbildung sind die Gebiete Waiblingen, Kernen im Remstal und Fellbach ohne Vereinfachung (links), sowie mit Vereinfachung für Zoomstufe 11 (rechts) dargestellt. Der Detailgrad der vereinfachten Geometrien ist deutlich geringer.</a:t>
+            </a:r>
+            <a:endParaRPr lang="de-DE" sz="2400" b="0" strike="noStrike" spc="-1" dirty="0">
+              <a:latin typeface="Arial"/>
+            </a:endParaRPr>
+          </a:p>
+        </p:txBody>
+      </p:sp>
+      <p:sp>
+        <p:nvSpPr>
+          <p:cNvPr id="68" name="CustomShape 20"/>
+          <p:cNvSpPr/>
+          <p:nvPr/>
+        </p:nvSpPr>
+        <p:spPr>
+          <a:xfrm>
+            <a:off x="16147800" y="19851840"/>
+            <a:ext cx="11624400" cy="1198875"/>
+          </a:xfrm>
+          <a:prstGeom prst="rect">
+            <a:avLst/>
+          </a:prstGeom>
+          <a:noFill/>
+          <a:ln>
+            <a:noFill/>
+          </a:ln>
+        </p:spPr>
+        <p:style>
+          <a:lnRef idx="0">
+            <a:scrgbClr r="0" g="0" b="0"/>
+          </a:lnRef>
+          <a:fillRef idx="0">
+            <a:scrgbClr r="0" g="0" b="0"/>
+          </a:fillRef>
+          <a:effectRef idx="0">
+            <a:scrgbClr r="0" g="0" b="0"/>
+          </a:effectRef>
+          <a:fontRef idx="minor"/>
+        </p:style>
+        <p:txBody>
+          <a:bodyPr lIns="90000" tIns="45000" rIns="90000" bIns="45000">
+            <a:spAutoFit/>
+          </a:bodyPr>
+          <a:lstStyle/>
           <a:p>
             <a:pPr>
               <a:lnSpc>
@@ -3655,31 +4302,31 @@
               </a:lnSpc>
             </a:pPr>
             <a:r>
-              <a:rPr b="0" lang="de-DE" sz="2400" spc="-1" strike="noStrike">
-                <a:solidFill>
-                  <a:srgbClr val="000000"/>
-                </a:solidFill>
-                <a:latin typeface="Arial"/>
-                <a:ea typeface="DejaVu Sans"/>
-              </a:rPr>
-              <a:t>ANZAHL PUNKTE NOCH REIN</a:t>
-            </a:r>
-            <a:endParaRPr b="0" lang="de-DE" sz="2400" spc="-1" strike="noStrike">
-              <a:latin typeface="Arial"/>
-            </a:endParaRPr>
-          </a:p>
-        </p:txBody>
-      </p:sp>
-      <p:sp>
-        <p:nvSpPr>
-          <p:cNvPr id="68" name="CustomShape 20"/>
+              <a:rPr lang="de-DE" sz="2400" b="0" strike="noStrike" spc="-1" dirty="0">
+                <a:solidFill>
+                  <a:srgbClr val="000000"/>
+                </a:solidFill>
+                <a:latin typeface="Arial"/>
+                <a:ea typeface="DejaVu Sans"/>
+              </a:rPr>
+              <a:t>Damit Benutzer Beschriftungen einfach mit den betreffenden Gebieten in Verbindung bringen können, werden anhand der Grenzverläufe die Position und Form gebogener Beschriftungen berechnet, die in die Gebiete gelegt werden können.</a:t>
+            </a:r>
+            <a:endParaRPr lang="de-DE" sz="2400" b="0" strike="noStrike" spc="-1" dirty="0">
+              <a:latin typeface="Arial"/>
+            </a:endParaRPr>
+          </a:p>
+        </p:txBody>
+      </p:sp>
+      <p:sp>
+        <p:nvSpPr>
+          <p:cNvPr id="69" name="CustomShape 21"/>
           <p:cNvSpPr/>
           <p:nvPr/>
         </p:nvSpPr>
         <p:spPr>
           <a:xfrm>
-            <a:off x="16147800" y="19851840"/>
-            <a:ext cx="11624400" cy="456120"/>
+            <a:off x="16147800" y="12939480"/>
+            <a:ext cx="11624400" cy="1937538"/>
           </a:xfrm>
           <a:prstGeom prst="rect">
             <a:avLst/>
@@ -3690,15 +4337,22 @@
           </a:ln>
         </p:spPr>
         <p:style>
-          <a:lnRef idx="0"/>
-          <a:fillRef idx="0"/>
-          <a:effectRef idx="0"/>
+          <a:lnRef idx="0">
+            <a:scrgbClr r="0" g="0" b="0"/>
+          </a:lnRef>
+          <a:fillRef idx="0">
+            <a:scrgbClr r="0" g="0" b="0"/>
+          </a:fillRef>
+          <a:effectRef idx="0">
+            <a:scrgbClr r="0" g="0" b="0"/>
+          </a:effectRef>
           <a:fontRef idx="minor"/>
         </p:style>
         <p:txBody>
-          <a:bodyPr lIns="90000" rIns="90000" tIns="45000" bIns="45000">
+          <a:bodyPr lIns="90000" tIns="45000" rIns="90000" bIns="45000">
             <a:spAutoFit/>
           </a:bodyPr>
+          <a:lstStyle/>
           <a:p>
             <a:pPr>
               <a:lnSpc>
@@ -3706,67 +4360,36 @@
               </a:lnSpc>
             </a:pPr>
             <a:r>
-              <a:rPr b="0" lang="de-DE" sz="2400" spc="-1" strike="noStrike">
-                <a:solidFill>
-                  <a:srgbClr val="000000"/>
-                </a:solidFill>
-                <a:latin typeface="Arial"/>
-                <a:ea typeface="DejaVu Sans"/>
-              </a:rPr>
-              <a:t>Kurzer Text zur Labelberechnung</a:t>
-            </a:r>
-            <a:endParaRPr b="0" lang="de-DE" sz="2400" spc="-1" strike="noStrike">
-              <a:latin typeface="Arial"/>
-            </a:endParaRPr>
-          </a:p>
-        </p:txBody>
-      </p:sp>
-      <p:sp>
-        <p:nvSpPr>
-          <p:cNvPr id="69" name="CustomShape 21"/>
-          <p:cNvSpPr/>
-          <p:nvPr/>
-        </p:nvSpPr>
-        <p:spPr>
-          <a:xfrm>
-            <a:off x="16147800" y="12939480"/>
-            <a:ext cx="11624400" cy="1552680"/>
-          </a:xfrm>
-          <a:prstGeom prst="rect">
-            <a:avLst/>
-          </a:prstGeom>
-          <a:noFill/>
-          <a:ln>
-            <a:noFill/>
-          </a:ln>
-        </p:spPr>
-        <p:style>
-          <a:lnRef idx="0"/>
-          <a:fillRef idx="0"/>
-          <a:effectRef idx="0"/>
-          <a:fontRef idx="minor"/>
-        </p:style>
-        <p:txBody>
-          <a:bodyPr lIns="90000" rIns="90000" tIns="45000" bIns="45000">
-            <a:spAutoFit/>
-          </a:bodyPr>
-          <a:p>
-            <a:pPr>
-              <a:lnSpc>
-                <a:spcPct val="100000"/>
-              </a:lnSpc>
-            </a:pPr>
-            <a:r>
-              <a:rPr b="0" lang="de-DE" sz="2400" spc="-1" strike="noStrike">
-                <a:solidFill>
-                  <a:srgbClr val="000000"/>
-                </a:solidFill>
-                <a:latin typeface="Arial"/>
-                <a:ea typeface="DejaVu Sans"/>
-              </a:rPr>
-              <a:t>Das Preprocessing extrahiert die relevanten Daten aus den OSM-Quelldateien um die Grenzen und Flächen zu vereinfachen sowie die gebogenen Labels zu positionieren. Anschließend werden die Ergebnisse in die Datenbank geschrieben, sodass sie vom Area-Server direkt bereitgestellt werden können.</a:t>
-            </a:r>
-            <a:endParaRPr b="0" lang="de-DE" sz="2400" spc="-1" strike="noStrike">
+              <a:rPr lang="de-DE" sz="2400" b="0" strike="noStrike" spc="-1" dirty="0">
+                <a:solidFill>
+                  <a:srgbClr val="000000"/>
+                </a:solidFill>
+                <a:latin typeface="Arial"/>
+                <a:ea typeface="DejaVu Sans"/>
+              </a:rPr>
+              <a:t>Die Vorverarbeitung extrahiert geografische Daten aus den OSM-Quelldateien, vereinfacht deren Grenzen für verschiedene Zoomstufen und berechnet die Position und Form von gebogenen Beschriftungen. Die Ergebnisse werden anschließend in eine </a:t>
+            </a:r>
+            <a:r>
+              <a:rPr lang="de-DE" sz="2400" b="0" strike="noStrike" spc="-1" dirty="0" err="1">
+                <a:solidFill>
+                  <a:srgbClr val="000000"/>
+                </a:solidFill>
+                <a:latin typeface="Arial"/>
+                <a:ea typeface="DejaVu Sans"/>
+              </a:rPr>
+              <a:t>spatiale</a:t>
+            </a:r>
+            <a:r>
+              <a:rPr lang="de-DE" sz="2400" b="0" strike="noStrike" spc="-1" dirty="0">
+                <a:solidFill>
+                  <a:srgbClr val="000000"/>
+                </a:solidFill>
+                <a:latin typeface="Arial"/>
+                <a:ea typeface="DejaVu Sans"/>
+              </a:rPr>
+              <a:t> Datenbank geschrieben, sodass sie vom Gebietsserver auf Anfrage des Clients bereitgestellt werden können.</a:t>
+            </a:r>
+            <a:endParaRPr lang="de-DE" sz="2400" b="0" strike="noStrike" spc="-1" dirty="0">
               <a:latin typeface="Arial"/>
             </a:endParaRPr>
           </a:p>
@@ -3811,83 +4434,9 @@
           <a:fontRef idx="minor"/>
         </p:style>
       </p:sp>
-      <p:sp>
-        <p:nvSpPr>
-          <p:cNvPr id="71" name="CustomShape 23"/>
-          <p:cNvSpPr/>
-          <p:nvPr/>
-        </p:nvSpPr>
-        <p:spPr>
-          <a:xfrm>
-            <a:off x="4915080" y="36080640"/>
-            <a:ext cx="7105320" cy="456120"/>
-          </a:xfrm>
-          <a:prstGeom prst="rect">
-            <a:avLst/>
-          </a:prstGeom>
-          <a:noFill/>
-          <a:ln>
-            <a:noFill/>
-          </a:ln>
-        </p:spPr>
-        <p:style>
-          <a:lnRef idx="0"/>
-          <a:fillRef idx="0"/>
-          <a:effectRef idx="0"/>
-          <a:fontRef idx="minor"/>
-        </p:style>
-        <p:txBody>
-          <a:bodyPr lIns="90000" rIns="90000" tIns="45000" bIns="45000">
-            <a:spAutoFit/>
-          </a:bodyPr>
-          <a:p>
-            <a:pPr>
-              <a:lnSpc>
-                <a:spcPct val="100000"/>
-              </a:lnSpc>
-            </a:pPr>
-            <a:r>
-              <a:rPr b="0" lang="de-DE" sz="2400" spc="-1" strike="noStrike">
-                <a:solidFill>
-                  <a:srgbClr val="000000"/>
-                </a:solidFill>
-                <a:latin typeface="Arial"/>
-                <a:ea typeface="DejaVu Sans"/>
-              </a:rPr>
-              <a:t>VLLT NOCH EIN BILD</a:t>
-            </a:r>
-            <a:endParaRPr b="0" lang="de-DE" sz="2400" spc="-1" strike="noStrike">
-              <a:latin typeface="Arial"/>
-            </a:endParaRPr>
-          </a:p>
-        </p:txBody>
-      </p:sp>
       <p:pic>
         <p:nvPicPr>
-          <p:cNvPr id="72" name="Grafik 9" descr=""/>
-          <p:cNvPicPr/>
-          <p:nvPr/>
-        </p:nvPicPr>
-        <p:blipFill>
-          <a:blip r:embed="rId9"/>
-          <a:stretch/>
-        </p:blipFill>
-        <p:spPr>
-          <a:xfrm>
-            <a:off x="16092720" y="14883840"/>
-            <a:ext cx="11734560" cy="3171600"/>
-          </a:xfrm>
-          <a:prstGeom prst="rect">
-            <a:avLst/>
-          </a:prstGeom>
-          <a:ln>
-            <a:noFill/>
-          </a:ln>
-        </p:spPr>
-      </p:pic>
-      <p:pic>
-        <p:nvPicPr>
-          <p:cNvPr id="73" name="Grafik 33" descr=""/>
+          <p:cNvPr id="72" name="Grafik 9"/>
           <p:cNvPicPr/>
           <p:nvPr/>
         </p:nvPicPr>
@@ -3897,8 +4446,8 @@
         </p:blipFill>
         <p:spPr>
           <a:xfrm>
-            <a:off x="17012880" y="32470560"/>
-            <a:ext cx="4619880" cy="3419640"/>
+            <a:off x="16092720" y="14883840"/>
+            <a:ext cx="11734560" cy="3171600"/>
           </a:xfrm>
           <a:prstGeom prst="rect">
             <a:avLst/>
@@ -3908,16 +4457,63 @@
           </a:ln>
         </p:spPr>
       </p:pic>
+      <p:pic>
+        <p:nvPicPr>
+          <p:cNvPr id="73" name="Grafik 33"/>
+          <p:cNvPicPr/>
+          <p:nvPr/>
+        </p:nvPicPr>
+        <p:blipFill>
+          <a:blip r:embed="rId8"/>
+          <a:stretch/>
+        </p:blipFill>
+        <p:spPr>
+          <a:xfrm>
+            <a:off x="17012880" y="32470560"/>
+            <a:ext cx="4619880" cy="3419640"/>
+          </a:xfrm>
+          <a:prstGeom prst="rect">
+            <a:avLst/>
+          </a:prstGeom>
+          <a:ln>
+            <a:noFill/>
+          </a:ln>
+        </p:spPr>
+      </p:pic>
+      <p:pic>
+        <p:nvPicPr>
+          <p:cNvPr id="3" name="Grafik 2">
+            <a:extLst>
+              <a:ext uri="{FF2B5EF4-FFF2-40B4-BE49-F238E27FC236}">
+                <a16:creationId xmlns:a16="http://schemas.microsoft.com/office/drawing/2014/main" id="{E3F6BDF5-EC19-4F10-A961-E75A027F3267}"/>
+              </a:ext>
+            </a:extLst>
+          </p:cNvPr>
+          <p:cNvPicPr>
+            <a:picLocks noChangeAspect="1"/>
+          </p:cNvPicPr>
+          <p:nvPr/>
+        </p:nvPicPr>
+        <p:blipFill rotWithShape="1">
+          <a:blip r:embed="rId11"/>
+          <a:srcRect t="13479" b="22008"/>
+          <a:stretch/>
+        </p:blipFill>
+        <p:spPr>
+          <a:xfrm>
+            <a:off x="2169534" y="35006399"/>
+            <a:ext cx="12496162" cy="3672721"/>
+          </a:xfrm>
+          <a:prstGeom prst="rect">
+            <a:avLst/>
+          </a:prstGeom>
+        </p:spPr>
+      </p:pic>
     </p:spTree>
   </p:cSld>
-  <mc:AlternateContent>
-    <mc:Choice Requires="p14">
-      <p:transition spd="slow" p14:dur="2000"/>
-    </mc:Choice>
-    <mc:Fallback>
-      <p:transition spd="slow"/>
-    </mc:Fallback>
-  </mc:AlternateContent>
+  <p:clrMapOvr>
+    <a:masterClrMapping/>
+  </p:clrMapOvr>
 </p:sld>
 </file>
 
@@ -3932,31 +4528,31 @@
         <a:sysClr val="window" lastClr="FFFFFF"/>
       </a:lt1>
       <a:dk2>
-        <a:srgbClr val="7f7f7f"/>
+        <a:srgbClr val="7F7F7F"/>
       </a:dk2>
       <a:lt2>
-        <a:srgbClr val="ffffff"/>
+        <a:srgbClr val="FFFFFF"/>
       </a:lt2>
       <a:accent1>
-        <a:srgbClr val="1bbbe9"/>
+        <a:srgbClr val="1BBBE9"/>
       </a:accent1>
       <a:accent2>
-        <a:srgbClr val="00519e"/>
+        <a:srgbClr val="00519E"/>
       </a:accent2>
       <a:accent3>
-        <a:srgbClr val="3e444c"/>
+        <a:srgbClr val="3E444C"/>
       </a:accent3>
       <a:accent4>
-        <a:srgbClr val="bdddf2"/>
+        <a:srgbClr val="BDDDF2"/>
       </a:accent4>
       <a:accent5>
-        <a:srgbClr val="4bacc6"/>
+        <a:srgbClr val="4BACC6"/>
       </a:accent5>
       <a:accent6>
-        <a:srgbClr val="7f7f7f"/>
+        <a:srgbClr val="7F7F7F"/>
       </a:accent6>
       <a:hlink>
-        <a:srgbClr val="ffff00"/>
+        <a:srgbClr val="FFFF00"/>
       </a:hlink>
       <a:folHlink>
         <a:srgbClr val="800080"/>
@@ -4141,5 +4737,7 @@
       </a:bgFillStyleLst>
     </a:fmtScheme>
   </a:themeElements>
+  <a:objectDefaults/>
+  <a:extraClrSchemeLst/>
 </a:theme>
 </file>
</xml_diff>